<commit_message>
našel jsem chybu díky zpracovávání prezentace, změna v tabulce pro preloaded data z názvu hodnot na SH
</commit_message>
<xml_diff>
--- a/presentation/Zakopal_prezentace.pptx
+++ b/presentation/Zakopal_prezentace.pptx
@@ -10,8 +10,8 @@
   <p:sldIdLst>
     <p:sldId id="369" r:id="rId2"/>
     <p:sldId id="371" r:id="rId3"/>
-    <p:sldId id="372" r:id="rId4"/>
-    <p:sldId id="373" r:id="rId5"/>
+    <p:sldId id="373" r:id="rId4"/>
+    <p:sldId id="380" r:id="rId5"/>
     <p:sldId id="374" r:id="rId6"/>
     <p:sldId id="376" r:id="rId7"/>
     <p:sldId id="378" r:id="rId8"/>
@@ -16435,7 +16435,7 @@
         </p:blipFill>
         <p:spPr>
           <a:xfrm>
-            <a:off x="220241" y="1179207"/>
+            <a:off x="248449" y="1402646"/>
             <a:ext cx="7052319" cy="3196015"/>
           </a:xfrm>
           <a:prstGeom prst="rect">
@@ -16445,10 +16445,10 @@
       </p:pic>
       <p:pic>
         <p:nvPicPr>
-          <p:cNvPr id="7" name="Picture 6">
+          <p:cNvPr id="3" name="Picture 2">
             <a:extLst>
               <a:ext uri="{FF2B5EF4-FFF2-40B4-BE49-F238E27FC236}">
-                <a16:creationId xmlns:a16="http://schemas.microsoft.com/office/drawing/2014/main" id="{324512A6-7C53-F422-13A2-6B4385A2C40E}"/>
+                <a16:creationId xmlns:a16="http://schemas.microsoft.com/office/drawing/2014/main" id="{428B8AC1-EC05-19C1-E4EE-1450EF053DD7}"/>
               </a:ext>
             </a:extLst>
           </p:cNvPr>
@@ -16471,8 +16471,8 @@
         </p:blipFill>
         <p:spPr>
           <a:xfrm>
-            <a:off x="4729005" y="3552555"/>
-            <a:ext cx="5131379" cy="3196015"/>
+            <a:off x="220241" y="5147989"/>
+            <a:ext cx="9640148" cy="1095796"/>
           </a:xfrm>
           <a:prstGeom prst="rect">
             <a:avLst/>
@@ -16493,105 +16493,6 @@
 </file>
 
 <file path=ppt/slides/slide3.xml><?xml version="1.0" encoding="utf-8"?>
-<p:sld xmlns:a="http://schemas.openxmlformats.org/drawingml/2006/main" xmlns:r="http://schemas.openxmlformats.org/officeDocument/2006/relationships" xmlns:p="http://schemas.openxmlformats.org/presentationml/2006/main">
-  <p:cSld>
-    <p:spTree>
-      <p:nvGrpSpPr>
-        <p:cNvPr id="1" name=""/>
-        <p:cNvGrpSpPr/>
-        <p:nvPr/>
-      </p:nvGrpSpPr>
-      <p:grpSpPr>
-        <a:xfrm>
-          <a:off x="0" y="0"/>
-          <a:ext cx="0" cy="0"/>
-          <a:chOff x="0" y="0"/>
-          <a:chExt cx="0" cy="0"/>
-        </a:xfrm>
-      </p:grpSpPr>
-      <p:sp>
-        <p:nvSpPr>
-          <p:cNvPr id="2" name="Title 1">
-            <a:extLst>
-              <a:ext uri="{FF2B5EF4-FFF2-40B4-BE49-F238E27FC236}">
-                <a16:creationId xmlns:a16="http://schemas.microsoft.com/office/drawing/2014/main" id="{A45BF3FC-B5FE-3BED-EB28-4FC2D7EDCAA2}"/>
-              </a:ext>
-            </a:extLst>
-          </p:cNvPr>
-          <p:cNvSpPr>
-            <a:spLocks noGrp="1"/>
-          </p:cNvSpPr>
-          <p:nvPr>
-            <p:ph type="title"/>
-          </p:nvPr>
-        </p:nvSpPr>
-        <p:spPr>
-          <a:xfrm>
-            <a:off x="1" y="307777"/>
-            <a:ext cx="10080624" cy="1095796"/>
-          </a:xfrm>
-        </p:spPr>
-        <p:txBody>
-          <a:bodyPr/>
-          <a:lstStyle/>
-          <a:p>
-            <a:r>
-              <a:rPr lang="en-CZ" dirty="0"/>
-              <a:t>High Level Synthesis (HLS)</a:t>
-            </a:r>
-          </a:p>
-        </p:txBody>
-      </p:sp>
-      <p:pic>
-        <p:nvPicPr>
-          <p:cNvPr id="4" name="Picture 3">
-            <a:extLst>
-              <a:ext uri="{FF2B5EF4-FFF2-40B4-BE49-F238E27FC236}">
-                <a16:creationId xmlns:a16="http://schemas.microsoft.com/office/drawing/2014/main" id="{54C66F1D-151B-34A8-711C-69DDD7BA38F9}"/>
-              </a:ext>
-            </a:extLst>
-          </p:cNvPr>
-          <p:cNvPicPr>
-            <a:picLocks noChangeAspect="1"/>
-          </p:cNvPicPr>
-          <p:nvPr/>
-        </p:nvPicPr>
-        <p:blipFill>
-          <a:blip r:embed="rId2">
-            <a:extLst>
-              <a:ext uri="{28A0092B-C50C-407E-A947-70E740481C1C}">
-                <a14:useLocalDpi xmlns:a14="http://schemas.microsoft.com/office/drawing/2010/main" val="0"/>
-              </a:ext>
-            </a:extLst>
-          </a:blip>
-          <a:stretch>
-            <a:fillRect/>
-          </a:stretch>
-        </p:blipFill>
-        <p:spPr>
-          <a:xfrm>
-            <a:off x="220238" y="3059757"/>
-            <a:ext cx="9640148" cy="1095796"/>
-          </a:xfrm>
-          <a:prstGeom prst="rect">
-            <a:avLst/>
-          </a:prstGeom>
-        </p:spPr>
-      </p:pic>
-    </p:spTree>
-    <p:extLst>
-      <p:ext uri="{BB962C8B-B14F-4D97-AF65-F5344CB8AC3E}">
-        <p14:creationId xmlns:p14="http://schemas.microsoft.com/office/powerpoint/2010/main" val="1968505514"/>
-      </p:ext>
-    </p:extLst>
-  </p:cSld>
-  <p:clrMapOvr>
-    <a:masterClrMapping/>
-  </p:clrMapOvr>
-</p:sld>
-</file>
-
-<file path=ppt/slides/slide4.xml><?xml version="1.0" encoding="utf-8"?>
 <p:sld xmlns:a="http://schemas.openxmlformats.org/drawingml/2006/main" xmlns:r="http://schemas.openxmlformats.org/officeDocument/2006/relationships" xmlns:p="http://schemas.openxmlformats.org/presentationml/2006/main">
   <p:cSld>
     <p:spTree>
@@ -16981,6 +16882,105 @@
     <p:extLst>
       <p:ext uri="{BB962C8B-B14F-4D97-AF65-F5344CB8AC3E}">
         <p14:creationId xmlns:p14="http://schemas.microsoft.com/office/powerpoint/2010/main" val="2192128781"/>
+      </p:ext>
+    </p:extLst>
+  </p:cSld>
+  <p:clrMapOvr>
+    <a:masterClrMapping/>
+  </p:clrMapOvr>
+</p:sld>
+</file>
+
+<file path=ppt/slides/slide4.xml><?xml version="1.0" encoding="utf-8"?>
+<p:sld xmlns:a="http://schemas.openxmlformats.org/drawingml/2006/main" xmlns:r="http://schemas.openxmlformats.org/officeDocument/2006/relationships" xmlns:p="http://schemas.openxmlformats.org/presentationml/2006/main">
+  <p:cSld>
+    <p:spTree>
+      <p:nvGrpSpPr>
+        <p:cNvPr id="1" name=""/>
+        <p:cNvGrpSpPr/>
+        <p:nvPr/>
+      </p:nvGrpSpPr>
+      <p:grpSpPr>
+        <a:xfrm>
+          <a:off x="0" y="0"/>
+          <a:ext cx="0" cy="0"/>
+          <a:chOff x="0" y="0"/>
+          <a:chExt cx="0" cy="0"/>
+        </a:xfrm>
+      </p:grpSpPr>
+      <p:sp>
+        <p:nvSpPr>
+          <p:cNvPr id="2" name="Title 1">
+            <a:extLst>
+              <a:ext uri="{FF2B5EF4-FFF2-40B4-BE49-F238E27FC236}">
+                <a16:creationId xmlns:a16="http://schemas.microsoft.com/office/drawing/2014/main" id="{A45BF3FC-B5FE-3BED-EB28-4FC2D7EDCAA2}"/>
+              </a:ext>
+            </a:extLst>
+          </p:cNvPr>
+          <p:cNvSpPr>
+            <a:spLocks noGrp="1"/>
+          </p:cNvSpPr>
+          <p:nvPr>
+            <p:ph type="title"/>
+          </p:nvPr>
+        </p:nvSpPr>
+        <p:spPr>
+          <a:xfrm>
+            <a:off x="1" y="307777"/>
+            <a:ext cx="10080624" cy="1095796"/>
+          </a:xfrm>
+        </p:spPr>
+        <p:txBody>
+          <a:bodyPr/>
+          <a:lstStyle/>
+          <a:p>
+            <a:r>
+              <a:rPr lang="en-CZ" dirty="0"/>
+              <a:t>Primární ukázka aplikace – FOC simulace</a:t>
+            </a:r>
+          </a:p>
+        </p:txBody>
+      </p:sp>
+      <p:pic>
+        <p:nvPicPr>
+          <p:cNvPr id="5" name="Picture 4">
+            <a:extLst>
+              <a:ext uri="{FF2B5EF4-FFF2-40B4-BE49-F238E27FC236}">
+                <a16:creationId xmlns:a16="http://schemas.microsoft.com/office/drawing/2014/main" id="{FED84642-3727-77A8-4809-8C2E1CB42997}"/>
+              </a:ext>
+            </a:extLst>
+          </p:cNvPr>
+          <p:cNvPicPr>
+            <a:picLocks noChangeAspect="1"/>
+          </p:cNvPicPr>
+          <p:nvPr/>
+        </p:nvPicPr>
+        <p:blipFill>
+          <a:blip r:embed="rId2">
+            <a:extLst>
+              <a:ext uri="{28A0092B-C50C-407E-A947-70E740481C1C}">
+                <a14:useLocalDpi xmlns:a14="http://schemas.microsoft.com/office/drawing/2010/main" val="0"/>
+              </a:ext>
+            </a:extLst>
+          </a:blip>
+          <a:stretch>
+            <a:fillRect/>
+          </a:stretch>
+        </p:blipFill>
+        <p:spPr>
+          <a:xfrm>
+            <a:off x="1406139" y="1403573"/>
+            <a:ext cx="7268344" cy="5390324"/>
+          </a:xfrm>
+          <a:prstGeom prst="rect">
+            <a:avLst/>
+          </a:prstGeom>
+        </p:spPr>
+      </p:pic>
+    </p:spTree>
+    <p:extLst>
+      <p:ext uri="{BB962C8B-B14F-4D97-AF65-F5344CB8AC3E}">
+        <p14:creationId xmlns:p14="http://schemas.microsoft.com/office/powerpoint/2010/main" val="4039502850"/>
       </p:ext>
     </p:extLst>
   </p:cSld>
@@ -17510,7 +17510,7 @@
           <a:p>
             <a:r>
               <a:rPr lang="en-CZ" dirty="0"/>
-              <a:t>Analýza běhu aplikace</a:t>
+              <a:t>Analýza běhu aplikace (porovnání)</a:t>
             </a:r>
           </a:p>
         </p:txBody>

</xml_diff>

<commit_message>
upravena prezentace a tex an sh
</commit_message>
<xml_diff>
--- a/presentation/Zakopal_prezentace.pptx
+++ b/presentation/Zakopal_prezentace.pptx
@@ -16435,8 +16435,8 @@
         </p:blipFill>
         <p:spPr>
           <a:xfrm>
-            <a:off x="248449" y="1402646"/>
-            <a:ext cx="7052319" cy="3196015"/>
+            <a:off x="359792" y="1290855"/>
+            <a:ext cx="7992888" cy="3622268"/>
           </a:xfrm>
           <a:prstGeom prst="rect">
             <a:avLst/>
@@ -16471,8 +16471,8 @@
         </p:blipFill>
         <p:spPr>
           <a:xfrm>
-            <a:off x="220241" y="5147989"/>
-            <a:ext cx="9640148" cy="1095796"/>
+            <a:off x="110117" y="5147989"/>
+            <a:ext cx="9860389" cy="1120831"/>
           </a:xfrm>
           <a:prstGeom prst="rect">
             <a:avLst/>
@@ -16936,7 +16936,7 @@
           <a:p>
             <a:r>
               <a:rPr lang="en-CZ" dirty="0"/>
-              <a:t>Primární ukázka aplikace – FOC simulace</a:t>
+              <a:t>Ukázka aplikace – FOC simulace</a:t>
             </a:r>
           </a:p>
         </p:txBody>
@@ -16969,8 +16969,8 @@
         </p:blipFill>
         <p:spPr>
           <a:xfrm>
-            <a:off x="1406139" y="1403573"/>
-            <a:ext cx="7268344" cy="5390324"/>
+            <a:off x="1205020" y="1423773"/>
+            <a:ext cx="7670584" cy="5688632"/>
           </a:xfrm>
           <a:prstGeom prst="rect">
             <a:avLst/>
@@ -17482,6 +17482,42 @@
           <a:chExt cx="0" cy="0"/>
         </a:xfrm>
       </p:grpSpPr>
+      <p:pic>
+        <p:nvPicPr>
+          <p:cNvPr id="3" name="Picture 2" descr="Table&#10;&#10;Description automatically generated">
+            <a:extLst>
+              <a:ext uri="{FF2B5EF4-FFF2-40B4-BE49-F238E27FC236}">
+                <a16:creationId xmlns:a16="http://schemas.microsoft.com/office/drawing/2014/main" id="{2000D41B-B430-F887-4A11-5AA2F2E33316}"/>
+              </a:ext>
+            </a:extLst>
+          </p:cNvPr>
+          <p:cNvPicPr>
+            <a:picLocks noChangeAspect="1"/>
+          </p:cNvPicPr>
+          <p:nvPr/>
+        </p:nvPicPr>
+        <p:blipFill>
+          <a:blip r:embed="rId3">
+            <a:extLst>
+              <a:ext uri="{28A0092B-C50C-407E-A947-70E740481C1C}">
+                <a14:useLocalDpi xmlns:a14="http://schemas.microsoft.com/office/drawing/2010/main" val="0"/>
+              </a:ext>
+            </a:extLst>
+          </a:blip>
+          <a:stretch>
+            <a:fillRect/>
+          </a:stretch>
+        </p:blipFill>
+        <p:spPr>
+          <a:xfrm>
+            <a:off x="282819" y="1206324"/>
+            <a:ext cx="9514986" cy="1728191"/>
+          </a:xfrm>
+          <a:prstGeom prst="rect">
+            <a:avLst/>
+          </a:prstGeom>
+        </p:spPr>
+      </p:pic>
       <p:sp>
         <p:nvSpPr>
           <p:cNvPr id="2" name="Title 1">
@@ -17515,42 +17551,6 @@
           </a:p>
         </p:txBody>
       </p:sp>
-      <p:pic>
-        <p:nvPicPr>
-          <p:cNvPr id="6" name="Picture 5" descr="Table&#10;&#10;Description automatically generated">
-            <a:extLst>
-              <a:ext uri="{FF2B5EF4-FFF2-40B4-BE49-F238E27FC236}">
-                <a16:creationId xmlns:a16="http://schemas.microsoft.com/office/drawing/2014/main" id="{79494D8C-3A84-90B9-FCD4-A70A0CFE5103}"/>
-              </a:ext>
-            </a:extLst>
-          </p:cNvPr>
-          <p:cNvPicPr>
-            <a:picLocks noChangeAspect="1"/>
-          </p:cNvPicPr>
-          <p:nvPr/>
-        </p:nvPicPr>
-        <p:blipFill>
-          <a:blip r:embed="rId3">
-            <a:extLst>
-              <a:ext uri="{28A0092B-C50C-407E-A947-70E740481C1C}">
-                <a14:useLocalDpi xmlns:a14="http://schemas.microsoft.com/office/drawing/2010/main" val="0"/>
-              </a:ext>
-            </a:extLst>
-          </a:blip>
-          <a:stretch>
-            <a:fillRect/>
-          </a:stretch>
-        </p:blipFill>
-        <p:spPr>
-          <a:xfrm>
-            <a:off x="385569" y="1351936"/>
-            <a:ext cx="9309483" cy="1629158"/>
-          </a:xfrm>
-          <a:prstGeom prst="rect">
-            <a:avLst/>
-          </a:prstGeom>
-        </p:spPr>
-      </p:pic>
       <p:pic>
         <p:nvPicPr>
           <p:cNvPr id="8" name="Picture 7" descr="Table&#10;&#10;Description automatically generated">
@@ -17675,7 +17675,7 @@
         </p:nvSpPr>
         <p:spPr bwMode="auto">
           <a:xfrm>
-            <a:off x="4536257" y="1701667"/>
+            <a:off x="4464248" y="1677729"/>
             <a:ext cx="1728192" cy="1095797"/>
           </a:xfrm>
           <a:prstGeom prst="frame">

</xml_diff>

<commit_message>
opraveno v foc info ohledně toho, proč je možné měřit pouze dva proudy a třetí dopočítat, další commit ještě upraví text
</commit_message>
<xml_diff>
--- a/presentation/Zakopal_prezentace.pptx
+++ b/presentation/Zakopal_prezentace.pptx
@@ -5,21 +5,23 @@
     <p:sldMasterId id="2147483648" r:id="rId1"/>
   </p:sldMasterIdLst>
   <p:notesMasterIdLst>
-    <p:notesMasterId r:id="rId14"/>
+    <p:notesMasterId r:id="rId16"/>
   </p:notesMasterIdLst>
   <p:sldIdLst>
     <p:sldId id="369" r:id="rId2"/>
     <p:sldId id="371" r:id="rId3"/>
     <p:sldId id="373" r:id="rId4"/>
-    <p:sldId id="380" r:id="rId5"/>
-    <p:sldId id="374" r:id="rId6"/>
-    <p:sldId id="376" r:id="rId7"/>
-    <p:sldId id="378" r:id="rId8"/>
-    <p:sldId id="379" r:id="rId9"/>
-    <p:sldId id="375" r:id="rId10"/>
-    <p:sldId id="328" r:id="rId11"/>
-    <p:sldId id="377" r:id="rId12"/>
-    <p:sldId id="334" r:id="rId13"/>
+    <p:sldId id="374" r:id="rId5"/>
+    <p:sldId id="378" r:id="rId6"/>
+    <p:sldId id="328" r:id="rId7"/>
+    <p:sldId id="377" r:id="rId8"/>
+    <p:sldId id="334" r:id="rId9"/>
+    <p:sldId id="382" r:id="rId10"/>
+    <p:sldId id="381" r:id="rId11"/>
+    <p:sldId id="380" r:id="rId12"/>
+    <p:sldId id="375" r:id="rId13"/>
+    <p:sldId id="376" r:id="rId14"/>
+    <p:sldId id="379" r:id="rId15"/>
   </p:sldIdLst>
   <p:sldSz cx="10080625" cy="7559675"/>
   <p:notesSz cx="6797675" cy="9928225"/>
@@ -13125,7 +13127,7 @@
               <a:pPr>
                 <a:defRPr/>
               </a:pPr>
-              <a:t>6</a:t>
+              <a:t>5</a:t>
             </a:fld>
             <a:endParaRPr lang="cs-CZ" altLang="cs-CZ" dirty="0"/>
           </a:p>
@@ -13134,7 +13136,7 @@
     </p:spTree>
     <p:extLst>
       <p:ext uri="{BB962C8B-B14F-4D97-AF65-F5344CB8AC3E}">
-        <p14:creationId xmlns:p14="http://schemas.microsoft.com/office/powerpoint/2010/main" val="975230295"/>
+        <p14:creationId xmlns:p14="http://schemas.microsoft.com/office/powerpoint/2010/main" val="154021963"/>
       </p:ext>
     </p:extLst>
   </p:cSld>
@@ -13215,7 +13217,7 @@
               <a:pPr>
                 <a:defRPr/>
               </a:pPr>
-              <a:t>7</a:t>
+              <a:t>13</a:t>
             </a:fld>
             <a:endParaRPr lang="cs-CZ" altLang="cs-CZ" dirty="0"/>
           </a:p>
@@ -13224,7 +13226,7 @@
     </p:spTree>
     <p:extLst>
       <p:ext uri="{BB962C8B-B14F-4D97-AF65-F5344CB8AC3E}">
-        <p14:creationId xmlns:p14="http://schemas.microsoft.com/office/powerpoint/2010/main" val="154021963"/>
+        <p14:creationId xmlns:p14="http://schemas.microsoft.com/office/powerpoint/2010/main" val="975230295"/>
       </p:ext>
     </p:extLst>
   </p:cSld>
@@ -13305,7 +13307,7 @@
               <a:pPr>
                 <a:defRPr/>
               </a:pPr>
-              <a:t>8</a:t>
+              <a:t>14</a:t>
             </a:fld>
             <a:endParaRPr lang="cs-CZ" altLang="cs-CZ" dirty="0"/>
           </a:p>
@@ -14312,7 +14314,7 @@
               <a:rPr lang="cs-CZ" sz="1600" dirty="0">
                 <a:latin typeface="Technika" panose="00000500000000000000" pitchFamily="2" charset="-18"/>
               </a:rPr>
-              <a:t>/10</a:t>
+              <a:t>/6</a:t>
             </a:r>
             <a:endParaRPr lang="en-US" dirty="0">
               <a:latin typeface="Technika" panose="00000500000000000000" pitchFamily="2" charset="-18"/>
@@ -15766,21 +15768,26 @@
         </p:nvSpPr>
         <p:spPr>
           <a:xfrm>
-            <a:off x="628095" y="3026076"/>
-            <a:ext cx="8824433" cy="1507521"/>
+            <a:off x="628095" y="3366952"/>
+            <a:ext cx="8824433" cy="825769"/>
           </a:xfrm>
         </p:spPr>
         <p:txBody>
           <a:bodyPr/>
           <a:lstStyle/>
           <a:p>
-            <a:pPr algn="ctr"/>
-            <a:endParaRPr lang="en-US" noProof="0" dirty="0"/>
-          </a:p>
-          <a:p>
             <a:pPr marL="0" indent="0" algn="ctr">
               <a:buNone/>
             </a:pPr>
+            <a:r>
+              <a:rPr lang="cs-CZ" sz="4400" noProof="0" dirty="0" err="1">
+                <a:solidFill>
+                  <a:srgbClr val="005EB8"/>
+                </a:solidFill>
+                <a:latin typeface="Technika" panose="00000500000000000000" pitchFamily="2" charset="-18"/>
+              </a:rPr>
+              <a:t>Backup</a:t>
+            </a:r>
             <a:r>
               <a:rPr lang="cs-CZ" sz="4400" noProof="0" dirty="0">
                 <a:solidFill>
@@ -15788,10 +15795,19 @@
                 </a:solidFill>
                 <a:latin typeface="Technika" panose="00000500000000000000" pitchFamily="2" charset="-18"/>
               </a:rPr>
-              <a:t>Děkuji za pozornost</a:t>
+              <a:t> </a:t>
             </a:r>
             <a:r>
-              <a:rPr lang="cs-CZ" sz="4400" dirty="0">
+              <a:rPr lang="cs-CZ" sz="4400" noProof="0" dirty="0" err="1">
+                <a:solidFill>
+                  <a:srgbClr val="005EB8"/>
+                </a:solidFill>
+                <a:latin typeface="Technika" panose="00000500000000000000" pitchFamily="2" charset="-18"/>
+              </a:rPr>
+              <a:t>slides</a:t>
+            </a:r>
+            <a:r>
+              <a:rPr lang="cs-CZ" sz="4400" noProof="0" dirty="0">
                 <a:solidFill>
                   <a:srgbClr val="005EB8"/>
                 </a:solidFill>
@@ -15811,7 +15827,7 @@
     </p:spTree>
     <p:extLst>
       <p:ext uri="{BB962C8B-B14F-4D97-AF65-F5344CB8AC3E}">
-        <p14:creationId xmlns:p14="http://schemas.microsoft.com/office/powerpoint/2010/main" val="1230451900"/>
+        <p14:creationId xmlns:p14="http://schemas.microsoft.com/office/powerpoint/2010/main" val="2327291214"/>
       </p:ext>
     </p:extLst>
   </p:cSld>
@@ -15840,84 +15856,77 @@
       </p:grpSpPr>
       <p:sp>
         <p:nvSpPr>
-          <p:cNvPr id="4" name="Rectangle 3">
+          <p:cNvPr id="2" name="Title 1">
             <a:extLst>
               <a:ext uri="{FF2B5EF4-FFF2-40B4-BE49-F238E27FC236}">
-                <a16:creationId xmlns:a16="http://schemas.microsoft.com/office/drawing/2014/main" id="{CBC4BD6D-D679-68FE-29B9-86A257FF02AF}"/>
+                <a16:creationId xmlns:a16="http://schemas.microsoft.com/office/drawing/2014/main" id="{A45BF3FC-B5FE-3BED-EB28-4FC2D7EDCAA2}"/>
               </a:ext>
             </a:extLst>
           </p:cNvPr>
-          <p:cNvSpPr/>
+          <p:cNvSpPr>
+            <a:spLocks noGrp="1"/>
+          </p:cNvSpPr>
+          <p:nvPr>
+            <p:ph type="title"/>
+          </p:nvPr>
+        </p:nvSpPr>
+        <p:spPr>
+          <a:xfrm>
+            <a:off x="1" y="307777"/>
+            <a:ext cx="10080624" cy="1095796"/>
+          </a:xfrm>
+        </p:spPr>
+        <p:txBody>
+          <a:bodyPr/>
+          <a:lstStyle/>
+          <a:p>
+            <a:r>
+              <a:rPr lang="en-CZ" dirty="0"/>
+              <a:t>Ukázka aplikace – FOC simulace</a:t>
+            </a:r>
+          </a:p>
+        </p:txBody>
+      </p:sp>
+      <p:pic>
+        <p:nvPicPr>
+          <p:cNvPr id="5" name="Picture 4">
+            <a:extLst>
+              <a:ext uri="{FF2B5EF4-FFF2-40B4-BE49-F238E27FC236}">
+                <a16:creationId xmlns:a16="http://schemas.microsoft.com/office/drawing/2014/main" id="{FED84642-3727-77A8-4809-8C2E1CB42997}"/>
+              </a:ext>
+            </a:extLst>
+          </p:cNvPr>
+          <p:cNvPicPr>
+            <a:picLocks noChangeAspect="1"/>
+          </p:cNvPicPr>
           <p:nvPr/>
-        </p:nvSpPr>
-        <p:spPr bwMode="auto">
+        </p:nvPicPr>
+        <p:blipFill>
+          <a:blip r:embed="rId2">
+            <a:extLst>
+              <a:ext uri="{28A0092B-C50C-407E-A947-70E740481C1C}">
+                <a14:useLocalDpi xmlns:a14="http://schemas.microsoft.com/office/drawing/2010/main" val="0"/>
+              </a:ext>
+            </a:extLst>
+          </a:blip>
+          <a:stretch>
+            <a:fillRect/>
+          </a:stretch>
+        </p:blipFill>
+        <p:spPr>
           <a:xfrm>
-            <a:off x="0" y="0"/>
-            <a:ext cx="10080625" cy="7559675"/>
+            <a:off x="1205020" y="1423773"/>
+            <a:ext cx="7670584" cy="5688632"/>
           </a:xfrm>
           <a:prstGeom prst="rect">
             <a:avLst/>
           </a:prstGeom>
-          <a:solidFill>
-            <a:schemeClr val="tx1"/>
-          </a:solidFill>
-          <a:ln w="9525" cap="flat" cmpd="sng" algn="ctr">
-            <a:solidFill>
-              <a:schemeClr val="tx1"/>
-            </a:solidFill>
-            <a:prstDash val="solid"/>
-            <a:round/>
-            <a:headEnd type="none" w="med" len="med"/>
-            <a:tailEnd type="none" w="med" len="med"/>
-          </a:ln>
-          <a:effectLst/>
         </p:spPr>
-        <p:txBody>
-          <a:bodyPr vert="horz" wrap="square" lIns="91440" tIns="45720" rIns="91440" bIns="45720" numCol="1" rtlCol="0" anchor="t" anchorCtr="0" compatLnSpc="1">
-            <a:prstTxWarp prst="textNoShape">
-              <a:avLst/>
-            </a:prstTxWarp>
-          </a:bodyPr>
-          <a:lstStyle/>
-          <a:p>
-            <a:pPr marL="0" marR="0" indent="0" algn="l" defTabSz="449263" rtl="0" eaLnBrk="1" fontAlgn="base" latinLnBrk="0" hangingPunct="0">
-              <a:lnSpc>
-                <a:spcPct val="93000"/>
-              </a:lnSpc>
-              <a:spcBef>
-                <a:spcPct val="0"/>
-              </a:spcBef>
-              <a:spcAft>
-                <a:spcPct val="0"/>
-              </a:spcAft>
-              <a:buClr>
-                <a:srgbClr val="000000"/>
-              </a:buClr>
-              <a:buSzPct val="100000"/>
-              <a:buFont typeface="Times New Roman" panose="02020603050405020304" pitchFamily="18" charset="0"/>
-              <a:buNone/>
-              <a:tabLst/>
-            </a:pPr>
-            <a:endParaRPr kumimoji="0" lang="en-CZ" sz="1800" b="0" i="0" u="none" strike="noStrike" cap="none" normalizeH="0" baseline="0" dirty="0">
-              <a:ln>
-                <a:solidFill>
-                  <a:sysClr val="windowText" lastClr="000000"/>
-                </a:solidFill>
-              </a:ln>
-              <a:solidFill>
-                <a:srgbClr val="E05206"/>
-              </a:solidFill>
-              <a:effectLst/>
-              <a:latin typeface="Arial" panose="020B0604020202020204" pitchFamily="34" charset="0"/>
-              <a:cs typeface="WenQuanYi Zen Hei" charset="0"/>
-            </a:endParaRPr>
-          </a:p>
-        </p:txBody>
-      </p:sp>
+      </p:pic>
     </p:spTree>
     <p:extLst>
       <p:ext uri="{BB962C8B-B14F-4D97-AF65-F5344CB8AC3E}">
-        <p14:creationId xmlns:p14="http://schemas.microsoft.com/office/powerpoint/2010/main" val="2197704723"/>
+        <p14:creationId xmlns:p14="http://schemas.microsoft.com/office/powerpoint/2010/main" val="4039502850"/>
       </p:ext>
     </p:extLst>
   </p:cSld>
@@ -15946,10 +15955,10 @@
       </p:grpSpPr>
       <p:sp>
         <p:nvSpPr>
-          <p:cNvPr id="2" name="Nadpis 1">
+          <p:cNvPr id="2" name="Title 1">
             <a:extLst>
               <a:ext uri="{FF2B5EF4-FFF2-40B4-BE49-F238E27FC236}">
-                <a16:creationId xmlns:a16="http://schemas.microsoft.com/office/drawing/2014/main" id="{50B1320F-8B04-28D1-3DC3-1D0E0863C753}"/>
+                <a16:creationId xmlns:a16="http://schemas.microsoft.com/office/drawing/2014/main" id="{A45BF3FC-B5FE-3BED-EB28-4FC2D7EDCAA2}"/>
               </a:ext>
             </a:extLst>
           </p:cNvPr>
@@ -15960,394 +15969,584 @@
             <p:ph type="title"/>
           </p:nvPr>
         </p:nvSpPr>
-        <p:spPr/>
+        <p:spPr>
+          <a:xfrm>
+            <a:off x="1" y="307777"/>
+            <a:ext cx="10080624" cy="1095796"/>
+          </a:xfrm>
+        </p:spPr>
         <p:txBody>
           <a:bodyPr/>
           <a:lstStyle/>
           <a:p>
             <a:r>
-              <a:rPr lang="cs-CZ" dirty="0"/>
-              <a:t>Otázka č. 1</a:t>
+              <a:rPr lang="en-CZ" dirty="0"/>
+              <a:t>Uspořádání pracoviště</a:t>
             </a:r>
-            <a:endParaRPr lang="en-US" dirty="0"/>
           </a:p>
         </p:txBody>
       </p:sp>
-      <mc:AlternateContent xmlns:mc="http://schemas.openxmlformats.org/markup-compatibility/2006" xmlns:a14="http://schemas.microsoft.com/office/drawing/2010/main">
-        <mc:Choice Requires="a14">
-          <p:sp>
-            <p:nvSpPr>
-              <p:cNvPr id="3" name="Zástupný obsah 2">
-                <a:extLst>
-                  <a:ext uri="{FF2B5EF4-FFF2-40B4-BE49-F238E27FC236}">
-                    <a16:creationId xmlns:a16="http://schemas.microsoft.com/office/drawing/2014/main" id="{E7D969BC-ADF2-0ADD-9B62-A691718A88B3}"/>
-                  </a:ext>
-                </a:extLst>
-              </p:cNvPr>
-              <p:cNvSpPr>
-                <a:spLocks noGrp="1"/>
-              </p:cNvSpPr>
-              <p:nvPr>
-                <p:ph idx="1"/>
-              </p:nvPr>
-            </p:nvSpPr>
-            <p:spPr/>
-            <p:txBody>
-              <a:bodyPr/>
-              <a:lstStyle/>
-              <a:p>
-                <a:pPr marL="285750" indent="-285750">
-                  <a:buFont typeface="Arial" panose="020B0604020202020204" pitchFamily="34" charset="0"/>
-                  <a:buChar char="•"/>
-                </a:pPr>
-                <a:r>
-                  <a:rPr lang="cs-CZ" b="1" dirty="0">
-                    <a:solidFill>
-                      <a:srgbClr val="0050A0"/>
-                    </a:solidFill>
-                  </a:rPr>
-                  <a:t>Q</a:t>
-                </a:r>
-                <a:r>
-                  <a:rPr lang="cs-CZ" dirty="0">
-                    <a:solidFill>
-                      <a:srgbClr val="0050A0"/>
-                    </a:solidFill>
-                  </a:rPr>
-                  <a:t>: Objasněte formu zápisu rovnice (2.4-5).</a:t>
-                </a:r>
-              </a:p>
-              <a:p>
-                <a:pPr marL="285750" indent="-285750">
-                  <a:buFont typeface="Arial" panose="020B0604020202020204" pitchFamily="34" charset="0"/>
-                  <a:buChar char="•"/>
-                </a:pPr>
-                <a:r>
-                  <a:rPr lang="cs-CZ" b="1" dirty="0"/>
-                  <a:t>A</a:t>
-                </a:r>
-                <a:r>
-                  <a:rPr lang="cs-CZ" dirty="0"/>
-                  <a:t>: Jedná se o bohužel o překlep, který mi unikl. Napětí a proudy mají být samozřejmě v notaci prostorových vektorů. Správná forma je</a:t>
-                </a:r>
-              </a:p>
-              <a:p>
-                <a:pPr marL="0" indent="0">
-                  <a:buNone/>
-                </a:pPr>
-                <a14:m>
-                  <m:oMathPara xmlns:m="http://schemas.openxmlformats.org/officeDocument/2006/math">
-                    <m:oMathParaPr>
-                      <m:jc m:val="centerGroup"/>
-                    </m:oMathParaPr>
-                    <m:oMath xmlns:m="http://schemas.openxmlformats.org/officeDocument/2006/math">
-                      <m:sSubSup>
-                        <m:sSubSupPr>
-                          <m:ctrlPr>
-                            <a:rPr lang="en-US" i="1">
-                              <a:latin typeface="Cambria Math" panose="02040503050406030204" pitchFamily="18" charset="0"/>
-                            </a:rPr>
-                          </m:ctrlPr>
-                        </m:sSubSupPr>
-                        <m:e>
-                          <m:r>
-                            <a:rPr lang="en-US" i="1">
-                              <a:latin typeface="Cambria Math" panose="02040503050406030204" pitchFamily="18" charset="0"/>
-                              <a:ea typeface="Calibri" panose="020F0502020204030204" pitchFamily="34" charset="0"/>
-                              <a:cs typeface="Times New Roman" panose="02020603050405020304" pitchFamily="18" charset="0"/>
-                            </a:rPr>
-                            <m:t> </m:t>
-                          </m:r>
-                          <m:bar>
-                            <m:barPr>
-                              <m:ctrlPr>
-                                <a:rPr lang="en-US" i="1">
-                                  <a:latin typeface="Cambria Math" panose="02040503050406030204" pitchFamily="18" charset="0"/>
-                                </a:rPr>
-                              </m:ctrlPr>
-                            </m:barPr>
-                            <m:e>
-                              <m:r>
-                                <a:rPr lang="en-US" i="1">
-                                  <a:latin typeface="Cambria Math" panose="02040503050406030204" pitchFamily="18" charset="0"/>
-                                  <a:ea typeface="Calibri" panose="020F0502020204030204" pitchFamily="34" charset="0"/>
-                                  <a:cs typeface="Times New Roman" panose="02020603050405020304" pitchFamily="18" charset="0"/>
-                                </a:rPr>
-                                <m:t>𝜓</m:t>
-                              </m:r>
-                            </m:e>
-                          </m:bar>
-                        </m:e>
-                        <m:sub>
-                          <m:r>
-                            <a:rPr lang="cs-CZ" i="1">
-                              <a:latin typeface="Cambria Math" panose="02040503050406030204" pitchFamily="18" charset="0"/>
-                              <a:ea typeface="Calibri" panose="020F0502020204030204" pitchFamily="34" charset="0"/>
-                              <a:cs typeface="Times New Roman" panose="02020603050405020304" pitchFamily="18" charset="0"/>
-                            </a:rPr>
-                            <m:t>1</m:t>
-                          </m:r>
-                        </m:sub>
-                        <m:sup>
-                          <m:r>
-                            <a:rPr lang="cs-CZ" i="1" smtClean="0">
-                              <a:latin typeface="Cambria Math" panose="02040503050406030204" pitchFamily="18" charset="0"/>
-                              <a:ea typeface="Calibri" panose="020F0502020204030204" pitchFamily="34" charset="0"/>
-                              <a:cs typeface="Times New Roman" panose="02020603050405020304" pitchFamily="18" charset="0"/>
-                            </a:rPr>
-                            <m:t>𝛼𝛽</m:t>
-                          </m:r>
-                        </m:sup>
-                      </m:sSubSup>
-                      <m:r>
-                        <a:rPr lang="cs-CZ" i="1">
-                          <a:latin typeface="Cambria Math" panose="02040503050406030204" pitchFamily="18" charset="0"/>
-                        </a:rPr>
-                        <m:t>=</m:t>
-                      </m:r>
-                      <m:nary>
-                        <m:naryPr>
-                          <m:ctrlPr>
-                            <a:rPr lang="cs-CZ" i="1">
-                              <a:latin typeface="Cambria Math" panose="02040503050406030204" pitchFamily="18" charset="0"/>
-                            </a:rPr>
-                          </m:ctrlPr>
-                        </m:naryPr>
-                        <m:sub>
-                          <m:r>
-                            <m:rPr>
-                              <m:brk m:alnAt="23"/>
-                            </m:rPr>
-                            <a:rPr lang="cs-CZ" i="1">
-                              <a:latin typeface="Cambria Math" panose="02040503050406030204" pitchFamily="18" charset="0"/>
-                            </a:rPr>
-                            <m:t>0</m:t>
-                          </m:r>
-                        </m:sub>
-                        <m:sup>
-                          <m:r>
-                            <a:rPr lang="cs-CZ" i="1">
-                              <a:latin typeface="Cambria Math" panose="02040503050406030204" pitchFamily="18" charset="0"/>
-                            </a:rPr>
-                            <m:t>𝑡</m:t>
-                          </m:r>
-                        </m:sup>
-                        <m:e>
-                          <m:d>
-                            <m:dPr>
-                              <m:ctrlPr>
-                                <a:rPr lang="cs-CZ" i="1">
-                                  <a:latin typeface="Cambria Math" panose="02040503050406030204" pitchFamily="18" charset="0"/>
-                                </a:rPr>
-                              </m:ctrlPr>
-                            </m:dPr>
-                            <m:e>
-                              <m:sSubSup>
-                                <m:sSubSupPr>
-                                  <m:ctrlPr>
-                                    <a:rPr lang="cs-CZ" i="1">
-                                      <a:latin typeface="Cambria Math" panose="02040503050406030204" pitchFamily="18" charset="0"/>
-                                    </a:rPr>
-                                  </m:ctrlPr>
-                                </m:sSubSupPr>
-                                <m:e>
-                                  <m:bar>
-                                    <m:barPr>
-                                      <m:ctrlPr>
-                                        <a:rPr lang="en-US" i="1">
-                                          <a:latin typeface="Cambria Math" panose="02040503050406030204" pitchFamily="18" charset="0"/>
-                                        </a:rPr>
-                                      </m:ctrlPr>
-                                    </m:barPr>
-                                    <m:e>
-                                      <m:r>
-                                        <a:rPr lang="cs-CZ" i="1">
-                                          <a:latin typeface="Cambria Math" panose="02040503050406030204" pitchFamily="18" charset="0"/>
-                                        </a:rPr>
-                                        <m:t>𝑢</m:t>
-                                      </m:r>
-                                    </m:e>
-                                  </m:bar>
-                                </m:e>
-                                <m:sub>
-                                  <m:r>
-                                    <a:rPr lang="cs-CZ" i="1">
-                                      <a:latin typeface="Cambria Math" panose="02040503050406030204" pitchFamily="18" charset="0"/>
-                                    </a:rPr>
-                                    <m:t>1</m:t>
-                                  </m:r>
-                                </m:sub>
-                                <m:sup>
-                                  <m:r>
-                                    <a:rPr lang="cs-CZ" i="1">
-                                      <a:latin typeface="Cambria Math" panose="02040503050406030204" pitchFamily="18" charset="0"/>
-                                      <a:ea typeface="Calibri" panose="020F0502020204030204" pitchFamily="34" charset="0"/>
-                                      <a:cs typeface="Times New Roman" panose="02020603050405020304" pitchFamily="18" charset="0"/>
-                                    </a:rPr>
-                                    <m:t>𝛼𝛽</m:t>
-                                  </m:r>
-                                </m:sup>
-                              </m:sSubSup>
-                              <m:r>
-                                <a:rPr lang="cs-CZ" i="1">
-                                  <a:latin typeface="Cambria Math" panose="02040503050406030204" pitchFamily="18" charset="0"/>
-                                </a:rPr>
-                                <m:t>−</m:t>
-                              </m:r>
-                              <m:sSub>
-                                <m:sSubPr>
-                                  <m:ctrlPr>
-                                    <a:rPr lang="cs-CZ" i="1">
-                                      <a:latin typeface="Cambria Math" panose="02040503050406030204" pitchFamily="18" charset="0"/>
-                                    </a:rPr>
-                                  </m:ctrlPr>
-                                </m:sSubPr>
-                                <m:e>
-                                  <m:r>
-                                    <a:rPr lang="cs-CZ" i="1">
-                                      <a:latin typeface="Cambria Math" panose="02040503050406030204" pitchFamily="18" charset="0"/>
-                                    </a:rPr>
-                                    <m:t>𝑅</m:t>
-                                  </m:r>
-                                </m:e>
-                                <m:sub>
-                                  <m:r>
-                                    <a:rPr lang="cs-CZ" i="1">
-                                      <a:latin typeface="Cambria Math" panose="02040503050406030204" pitchFamily="18" charset="0"/>
-                                    </a:rPr>
-                                    <m:t>1</m:t>
-                                  </m:r>
-                                </m:sub>
-                              </m:sSub>
-                              <m:sSubSup>
-                                <m:sSubSupPr>
-                                  <m:ctrlPr>
-                                    <a:rPr lang="cs-CZ" i="1">
-                                      <a:latin typeface="Cambria Math" panose="02040503050406030204" pitchFamily="18" charset="0"/>
-                                    </a:rPr>
-                                  </m:ctrlPr>
-                                </m:sSubSupPr>
-                                <m:e>
-                                  <m:bar>
-                                    <m:barPr>
-                                      <m:ctrlPr>
-                                        <a:rPr lang="en-US" i="1">
-                                          <a:latin typeface="Cambria Math" panose="02040503050406030204" pitchFamily="18" charset="0"/>
-                                        </a:rPr>
-                                      </m:ctrlPr>
-                                    </m:barPr>
-                                    <m:e>
-                                      <m:r>
-                                        <a:rPr lang="cs-CZ" i="1">
-                                          <a:latin typeface="Cambria Math" panose="02040503050406030204" pitchFamily="18" charset="0"/>
-                                        </a:rPr>
-                                        <m:t>𝑖</m:t>
-                                      </m:r>
-                                    </m:e>
-                                  </m:bar>
-                                </m:e>
-                                <m:sub>
-                                  <m:r>
-                                    <a:rPr lang="cs-CZ" i="1">
-                                      <a:latin typeface="Cambria Math" panose="02040503050406030204" pitchFamily="18" charset="0"/>
-                                    </a:rPr>
-                                    <m:t>1</m:t>
-                                  </m:r>
-                                </m:sub>
-                                <m:sup>
-                                  <m:r>
-                                    <a:rPr lang="cs-CZ" i="1">
-                                      <a:latin typeface="Cambria Math" panose="02040503050406030204" pitchFamily="18" charset="0"/>
-                                      <a:ea typeface="Calibri" panose="020F0502020204030204" pitchFamily="34" charset="0"/>
-                                      <a:cs typeface="Times New Roman" panose="02020603050405020304" pitchFamily="18" charset="0"/>
-                                    </a:rPr>
-                                    <m:t>𝛼𝛽</m:t>
-                                  </m:r>
-                                </m:sup>
-                              </m:sSubSup>
-                            </m:e>
-                          </m:d>
-                        </m:e>
-                      </m:nary>
-                      <m:r>
-                        <m:rPr>
-                          <m:sty m:val="p"/>
-                        </m:rPr>
-                        <a:rPr lang="cs-CZ">
-                          <a:latin typeface="Cambria Math" panose="02040503050406030204" pitchFamily="18" charset="0"/>
-                        </a:rPr>
-                        <m:t>d</m:t>
-                      </m:r>
-                      <m:r>
-                        <a:rPr lang="cs-CZ" i="1">
-                          <a:latin typeface="Cambria Math" panose="02040503050406030204" pitchFamily="18" charset="0"/>
-                        </a:rPr>
-                        <m:t>𝜏</m:t>
-                      </m:r>
-                      <m:r>
-                        <a:rPr lang="cs-CZ" b="0" i="1" smtClean="0">
-                          <a:latin typeface="Cambria Math" panose="02040503050406030204" pitchFamily="18" charset="0"/>
-                        </a:rPr>
-                        <m:t>.</m:t>
-                      </m:r>
-                    </m:oMath>
-                  </m:oMathPara>
-                </a14:m>
-                <a:endParaRPr lang="cs-CZ" dirty="0"/>
-              </a:p>
-              <a:p>
-                <a:pPr marL="0" indent="0">
-                  <a:buNone/>
-                </a:pPr>
-                <a:endParaRPr lang="en-US" dirty="0"/>
-              </a:p>
-            </p:txBody>
-          </p:sp>
-        </mc:Choice>
-        <mc:Fallback xmlns="">
-          <p:sp>
-            <p:nvSpPr>
-              <p:cNvPr id="3" name="Zástupný obsah 2">
-                <a:extLst>
-                  <a:ext uri="{FF2B5EF4-FFF2-40B4-BE49-F238E27FC236}">
-                    <a16:creationId xmlns:a16="http://schemas.microsoft.com/office/drawing/2014/main" id="{E7D969BC-ADF2-0ADD-9B62-A691718A88B3}"/>
-                  </a:ext>
-                </a:extLst>
-              </p:cNvPr>
-              <p:cNvSpPr>
-                <a:spLocks noGrp="1" noRot="1" noChangeAspect="1" noMove="1" noResize="1" noEditPoints="1" noAdjustHandles="1" noChangeArrowheads="1" noChangeShapeType="1" noTextEdit="1"/>
-              </p:cNvSpPr>
-              <p:nvPr>
-                <p:ph idx="1"/>
-              </p:nvPr>
-            </p:nvSpPr>
-            <p:spPr>
-              <a:blipFill>
-                <a:blip r:embed="rId2"/>
-                <a:stretch>
-                  <a:fillRect l="-1865" t="-1982" r="-1588"/>
-                </a:stretch>
-              </a:blipFill>
-            </p:spPr>
-            <p:txBody>
-              <a:bodyPr/>
-              <a:lstStyle/>
-              <a:p>
-                <a:r>
-                  <a:rPr lang="en-US">
-                    <a:noFill/>
-                  </a:rPr>
-                  <a:t> </a:t>
-                </a:r>
-              </a:p>
-            </p:txBody>
-          </p:sp>
-        </mc:Fallback>
-      </mc:AlternateContent>
+      <p:pic>
+        <p:nvPicPr>
+          <p:cNvPr id="4" name="Picture 3">
+            <a:extLst>
+              <a:ext uri="{FF2B5EF4-FFF2-40B4-BE49-F238E27FC236}">
+                <a16:creationId xmlns:a16="http://schemas.microsoft.com/office/drawing/2014/main" id="{3847CDE0-46E1-AD26-385E-729E597ED249}"/>
+              </a:ext>
+            </a:extLst>
+          </p:cNvPr>
+          <p:cNvPicPr>
+            <a:picLocks noChangeAspect="1"/>
+          </p:cNvPicPr>
+          <p:nvPr/>
+        </p:nvPicPr>
+        <p:blipFill>
+          <a:blip r:embed="rId2">
+            <a:extLst>
+              <a:ext uri="{28A0092B-C50C-407E-A947-70E740481C1C}">
+                <a14:useLocalDpi xmlns:a14="http://schemas.microsoft.com/office/drawing/2010/main" val="0"/>
+              </a:ext>
+            </a:extLst>
+          </a:blip>
+          <a:stretch>
+            <a:fillRect/>
+          </a:stretch>
+        </p:blipFill>
+        <p:spPr>
+          <a:xfrm>
+            <a:off x="184677" y="1367930"/>
+            <a:ext cx="9711270" cy="4641011"/>
+          </a:xfrm>
+          <a:prstGeom prst="rect">
+            <a:avLst/>
+          </a:prstGeom>
+        </p:spPr>
+      </p:pic>
     </p:spTree>
     <p:extLst>
       <p:ext uri="{BB962C8B-B14F-4D97-AF65-F5344CB8AC3E}">
-        <p14:creationId xmlns:p14="http://schemas.microsoft.com/office/powerpoint/2010/main" val="1952982223"/>
+        <p14:creationId xmlns:p14="http://schemas.microsoft.com/office/powerpoint/2010/main" val="2508119481"/>
+      </p:ext>
+    </p:extLst>
+  </p:cSld>
+  <p:clrMapOvr>
+    <a:masterClrMapping/>
+  </p:clrMapOvr>
+</p:sld>
+</file>
+
+<file path=ppt/slides/slide13.xml><?xml version="1.0" encoding="utf-8"?>
+<p:sld xmlns:a="http://schemas.openxmlformats.org/drawingml/2006/main" xmlns:r="http://schemas.openxmlformats.org/officeDocument/2006/relationships" xmlns:p="http://schemas.openxmlformats.org/presentationml/2006/main">
+  <p:cSld>
+    <p:spTree>
+      <p:nvGrpSpPr>
+        <p:cNvPr id="1" name=""/>
+        <p:cNvGrpSpPr/>
+        <p:nvPr/>
+      </p:nvGrpSpPr>
+      <p:grpSpPr>
+        <a:xfrm>
+          <a:off x="0" y="0"/>
+          <a:ext cx="0" cy="0"/>
+          <a:chOff x="0" y="0"/>
+          <a:chExt cx="0" cy="0"/>
+        </a:xfrm>
+      </p:grpSpPr>
+      <p:sp>
+        <p:nvSpPr>
+          <p:cNvPr id="2" name="Title 1">
+            <a:extLst>
+              <a:ext uri="{FF2B5EF4-FFF2-40B4-BE49-F238E27FC236}">
+                <a16:creationId xmlns:a16="http://schemas.microsoft.com/office/drawing/2014/main" id="{A45BF3FC-B5FE-3BED-EB28-4FC2D7EDCAA2}"/>
+              </a:ext>
+            </a:extLst>
+          </p:cNvPr>
+          <p:cNvSpPr>
+            <a:spLocks noGrp="1"/>
+          </p:cNvSpPr>
+          <p:nvPr>
+            <p:ph type="title"/>
+          </p:nvPr>
+        </p:nvSpPr>
+        <p:spPr>
+          <a:xfrm>
+            <a:off x="1" y="307777"/>
+            <a:ext cx="10080624" cy="1095796"/>
+          </a:xfrm>
+        </p:spPr>
+        <p:txBody>
+          <a:bodyPr/>
+          <a:lstStyle/>
+          <a:p>
+            <a:r>
+              <a:rPr lang="en-CZ" dirty="0"/>
+              <a:t>Analýza běhu aplikace</a:t>
+            </a:r>
+          </a:p>
+        </p:txBody>
+      </p:sp>
+      <p:pic>
+        <p:nvPicPr>
+          <p:cNvPr id="4" name="Picture 3" descr="A picture containing chart&#10;&#10;Description automatically generated">
+            <a:extLst>
+              <a:ext uri="{FF2B5EF4-FFF2-40B4-BE49-F238E27FC236}">
+                <a16:creationId xmlns:a16="http://schemas.microsoft.com/office/drawing/2014/main" id="{AEEA3901-28F7-D559-4629-AF3EB3399A20}"/>
+              </a:ext>
+            </a:extLst>
+          </p:cNvPr>
+          <p:cNvPicPr>
+            <a:picLocks noChangeAspect="1"/>
+          </p:cNvPicPr>
+          <p:nvPr/>
+        </p:nvPicPr>
+        <p:blipFill>
+          <a:blip r:embed="rId3">
+            <a:extLst>
+              <a:ext uri="{28A0092B-C50C-407E-A947-70E740481C1C}">
+                <a14:useLocalDpi xmlns:a14="http://schemas.microsoft.com/office/drawing/2010/main" val="0"/>
+              </a:ext>
+            </a:extLst>
+          </a:blip>
+          <a:stretch>
+            <a:fillRect/>
+          </a:stretch>
+        </p:blipFill>
+        <p:spPr>
+          <a:xfrm>
+            <a:off x="19368" y="1643714"/>
+            <a:ext cx="9845479" cy="5608184"/>
+          </a:xfrm>
+          <a:prstGeom prst="rect">
+            <a:avLst/>
+          </a:prstGeom>
+        </p:spPr>
+      </p:pic>
+      <p:sp>
+        <p:nvSpPr>
+          <p:cNvPr id="5" name="Nadpis 1">
+            <a:extLst>
+              <a:ext uri="{FF2B5EF4-FFF2-40B4-BE49-F238E27FC236}">
+                <a16:creationId xmlns:a16="http://schemas.microsoft.com/office/drawing/2014/main" id="{8E674679-081B-AA64-ACFD-A9A29B3FF42A}"/>
+              </a:ext>
+            </a:extLst>
+          </p:cNvPr>
+          <p:cNvSpPr txBox="1">
+            <a:spLocks/>
+          </p:cNvSpPr>
+          <p:nvPr/>
+        </p:nvSpPr>
+        <p:spPr bwMode="auto">
+          <a:xfrm>
+            <a:off x="143768" y="1187549"/>
+            <a:ext cx="9793087" cy="432048"/>
+          </a:xfrm>
+          <a:prstGeom prst="rect">
+            <a:avLst/>
+          </a:prstGeom>
+          <a:noFill/>
+          <a:ln w="9525">
+            <a:noFill/>
+            <a:round/>
+            <a:headEnd/>
+            <a:tailEnd/>
+          </a:ln>
+          <a:effectLst/>
+          <a:extLst>
+            <a:ext uri="{909E8E84-426E-40DD-AFC4-6F175D3DCCD1}">
+              <a14:hiddenFill xmlns:a14="http://schemas.microsoft.com/office/drawing/2010/main">
+                <a:solidFill>
+                  <a:srgbClr val="FFFFFF"/>
+                </a:solidFill>
+              </a14:hiddenFill>
+            </a:ext>
+            <a:ext uri="{AF507438-7753-43E0-B8FC-AC1667EBCBE1}">
+              <a14:hiddenEffects xmlns:a14="http://schemas.microsoft.com/office/drawing/2010/main">
+                <a:effectLst>
+                  <a:outerShdw dist="35921" dir="2700000" algn="ctr" rotWithShape="0">
+                    <a:schemeClr val="bg2"/>
+                  </a:outerShdw>
+                </a:effectLst>
+              </a14:hiddenEffects>
+            </a:ext>
+          </a:extLst>
+        </p:spPr>
+        <p:txBody>
+          <a:bodyPr vert="horz" wrap="square" lIns="0" tIns="0" rIns="0" bIns="0" numCol="1" anchor="ctr" anchorCtr="0" compatLnSpc="1">
+            <a:prstTxWarp prst="textNoShape">
+              <a:avLst/>
+            </a:prstTxWarp>
+          </a:bodyPr>
+          <a:lstStyle>
+            <a:lvl1pPr algn="ctr" defTabSz="449263" rtl="0" eaLnBrk="0" fontAlgn="base" hangingPunct="0">
+              <a:lnSpc>
+                <a:spcPct val="93000"/>
+              </a:lnSpc>
+              <a:spcBef>
+                <a:spcPct val="0"/>
+              </a:spcBef>
+              <a:spcAft>
+                <a:spcPct val="0"/>
+              </a:spcAft>
+              <a:buClr>
+                <a:srgbClr val="000000"/>
+              </a:buClr>
+              <a:buSzPct val="100000"/>
+              <a:buFont typeface="Times New Roman" panose="02020603050405020304" pitchFamily="18" charset="0"/>
+              <a:defRPr sz="4000" kern="1200" cap="all" baseline="0">
+                <a:solidFill>
+                  <a:srgbClr val="005EB8"/>
+                </a:solidFill>
+                <a:latin typeface="Technika" panose="00000500000000000000" pitchFamily="2" charset="-18"/>
+                <a:ea typeface="Technika" panose="00000500000000000000" pitchFamily="2" charset="-18"/>
+                <a:cs typeface="Technika" panose="00000500000000000000" pitchFamily="2" charset="-18"/>
+              </a:defRPr>
+            </a:lvl1pPr>
+            <a:lvl2pPr algn="ctr" defTabSz="449263" rtl="0" eaLnBrk="0" fontAlgn="base" hangingPunct="0">
+              <a:lnSpc>
+                <a:spcPct val="93000"/>
+              </a:lnSpc>
+              <a:spcBef>
+                <a:spcPct val="0"/>
+              </a:spcBef>
+              <a:spcAft>
+                <a:spcPct val="0"/>
+              </a:spcAft>
+              <a:buClr>
+                <a:srgbClr val="000000"/>
+              </a:buClr>
+              <a:buSzPct val="100000"/>
+              <a:buFont typeface="Times New Roman" panose="02020603050405020304" pitchFamily="18" charset="0"/>
+              <a:defRPr sz="4400">
+                <a:solidFill>
+                  <a:srgbClr val="000000"/>
+                </a:solidFill>
+                <a:latin typeface="Liberation Sans" panose="020B0604020202020204" pitchFamily="34" charset="0"/>
+                <a:cs typeface="Liberation Sans" panose="020B0604020202020204" pitchFamily="34" charset="0"/>
+              </a:defRPr>
+            </a:lvl2pPr>
+            <a:lvl3pPr algn="ctr" defTabSz="449263" rtl="0" eaLnBrk="0" fontAlgn="base" hangingPunct="0">
+              <a:lnSpc>
+                <a:spcPct val="93000"/>
+              </a:lnSpc>
+              <a:spcBef>
+                <a:spcPct val="0"/>
+              </a:spcBef>
+              <a:spcAft>
+                <a:spcPct val="0"/>
+              </a:spcAft>
+              <a:buClr>
+                <a:srgbClr val="000000"/>
+              </a:buClr>
+              <a:buSzPct val="100000"/>
+              <a:buFont typeface="Times New Roman" panose="02020603050405020304" pitchFamily="18" charset="0"/>
+              <a:defRPr sz="4400">
+                <a:solidFill>
+                  <a:srgbClr val="000000"/>
+                </a:solidFill>
+                <a:latin typeface="Liberation Sans" panose="020B0604020202020204" pitchFamily="34" charset="0"/>
+                <a:cs typeface="Liberation Sans" panose="020B0604020202020204" pitchFamily="34" charset="0"/>
+              </a:defRPr>
+            </a:lvl3pPr>
+            <a:lvl4pPr algn="ctr" defTabSz="449263" rtl="0" eaLnBrk="0" fontAlgn="base" hangingPunct="0">
+              <a:lnSpc>
+                <a:spcPct val="93000"/>
+              </a:lnSpc>
+              <a:spcBef>
+                <a:spcPct val="0"/>
+              </a:spcBef>
+              <a:spcAft>
+                <a:spcPct val="0"/>
+              </a:spcAft>
+              <a:buClr>
+                <a:srgbClr val="000000"/>
+              </a:buClr>
+              <a:buSzPct val="100000"/>
+              <a:buFont typeface="Times New Roman" panose="02020603050405020304" pitchFamily="18" charset="0"/>
+              <a:defRPr sz="4400">
+                <a:solidFill>
+                  <a:srgbClr val="000000"/>
+                </a:solidFill>
+                <a:latin typeface="Liberation Sans" panose="020B0604020202020204" pitchFamily="34" charset="0"/>
+                <a:cs typeface="Liberation Sans" panose="020B0604020202020204" pitchFamily="34" charset="0"/>
+              </a:defRPr>
+            </a:lvl4pPr>
+            <a:lvl5pPr algn="ctr" defTabSz="449263" rtl="0" eaLnBrk="0" fontAlgn="base" hangingPunct="0">
+              <a:lnSpc>
+                <a:spcPct val="93000"/>
+              </a:lnSpc>
+              <a:spcBef>
+                <a:spcPct val="0"/>
+              </a:spcBef>
+              <a:spcAft>
+                <a:spcPct val="0"/>
+              </a:spcAft>
+              <a:buClr>
+                <a:srgbClr val="000000"/>
+              </a:buClr>
+              <a:buSzPct val="100000"/>
+              <a:buFont typeface="Times New Roman" panose="02020603050405020304" pitchFamily="18" charset="0"/>
+              <a:defRPr sz="4400">
+                <a:solidFill>
+                  <a:srgbClr val="000000"/>
+                </a:solidFill>
+                <a:latin typeface="Liberation Sans" panose="020B0604020202020204" pitchFamily="34" charset="0"/>
+                <a:cs typeface="Liberation Sans" panose="020B0604020202020204" pitchFamily="34" charset="0"/>
+              </a:defRPr>
+            </a:lvl5pPr>
+            <a:lvl6pPr marL="2514600" indent="-228600" algn="ctr" defTabSz="449263" rtl="0" fontAlgn="base" hangingPunct="0">
+              <a:lnSpc>
+                <a:spcPct val="93000"/>
+              </a:lnSpc>
+              <a:spcBef>
+                <a:spcPct val="0"/>
+              </a:spcBef>
+              <a:spcAft>
+                <a:spcPct val="0"/>
+              </a:spcAft>
+              <a:buClr>
+                <a:srgbClr val="000000"/>
+              </a:buClr>
+              <a:buSzPct val="100000"/>
+              <a:buFont typeface="Times New Roman" panose="02020603050405020304" pitchFamily="18" charset="0"/>
+              <a:defRPr sz="4400">
+                <a:solidFill>
+                  <a:srgbClr val="000000"/>
+                </a:solidFill>
+                <a:latin typeface="Arial" panose="020B0604020202020204" pitchFamily="34" charset="0"/>
+                <a:cs typeface="WenQuanYi Zen Hei" charset="0"/>
+              </a:defRPr>
+            </a:lvl6pPr>
+            <a:lvl7pPr marL="2971800" indent="-228600" algn="ctr" defTabSz="449263" rtl="0" fontAlgn="base" hangingPunct="0">
+              <a:lnSpc>
+                <a:spcPct val="93000"/>
+              </a:lnSpc>
+              <a:spcBef>
+                <a:spcPct val="0"/>
+              </a:spcBef>
+              <a:spcAft>
+                <a:spcPct val="0"/>
+              </a:spcAft>
+              <a:buClr>
+                <a:srgbClr val="000000"/>
+              </a:buClr>
+              <a:buSzPct val="100000"/>
+              <a:buFont typeface="Times New Roman" panose="02020603050405020304" pitchFamily="18" charset="0"/>
+              <a:defRPr sz="4400">
+                <a:solidFill>
+                  <a:srgbClr val="000000"/>
+                </a:solidFill>
+                <a:latin typeface="Arial" panose="020B0604020202020204" pitchFamily="34" charset="0"/>
+                <a:cs typeface="WenQuanYi Zen Hei" charset="0"/>
+              </a:defRPr>
+            </a:lvl7pPr>
+            <a:lvl8pPr marL="3429000" indent="-228600" algn="ctr" defTabSz="449263" rtl="0" fontAlgn="base" hangingPunct="0">
+              <a:lnSpc>
+                <a:spcPct val="93000"/>
+              </a:lnSpc>
+              <a:spcBef>
+                <a:spcPct val="0"/>
+              </a:spcBef>
+              <a:spcAft>
+                <a:spcPct val="0"/>
+              </a:spcAft>
+              <a:buClr>
+                <a:srgbClr val="000000"/>
+              </a:buClr>
+              <a:buSzPct val="100000"/>
+              <a:buFont typeface="Times New Roman" panose="02020603050405020304" pitchFamily="18" charset="0"/>
+              <a:defRPr sz="4400">
+                <a:solidFill>
+                  <a:srgbClr val="000000"/>
+                </a:solidFill>
+                <a:latin typeface="Arial" panose="020B0604020202020204" pitchFamily="34" charset="0"/>
+                <a:cs typeface="WenQuanYi Zen Hei" charset="0"/>
+              </a:defRPr>
+            </a:lvl8pPr>
+            <a:lvl9pPr marL="3886200" indent="-228600" algn="ctr" defTabSz="449263" rtl="0" fontAlgn="base" hangingPunct="0">
+              <a:lnSpc>
+                <a:spcPct val="93000"/>
+              </a:lnSpc>
+              <a:spcBef>
+                <a:spcPct val="0"/>
+              </a:spcBef>
+              <a:spcAft>
+                <a:spcPct val="0"/>
+              </a:spcAft>
+              <a:buClr>
+                <a:srgbClr val="000000"/>
+              </a:buClr>
+              <a:buSzPct val="100000"/>
+              <a:buFont typeface="Times New Roman" panose="02020603050405020304" pitchFamily="18" charset="0"/>
+              <a:defRPr sz="4400">
+                <a:solidFill>
+                  <a:srgbClr val="000000"/>
+                </a:solidFill>
+                <a:latin typeface="Arial" panose="020B0604020202020204" pitchFamily="34" charset="0"/>
+                <a:cs typeface="WenQuanYi Zen Hei" charset="0"/>
+              </a:defRPr>
+            </a:lvl9pPr>
+          </a:lstStyle>
+          <a:p>
+            <a:r>
+              <a:rPr lang="cs-CZ" sz="2000" b="1" i="1" dirty="0">
+                <a:solidFill>
+                  <a:srgbClr val="E05206"/>
+                </a:solidFill>
+              </a:rPr>
+              <a:t>CPU/FPGA Model</a:t>
+            </a:r>
+          </a:p>
+        </p:txBody>
+      </p:sp>
+    </p:spTree>
+    <p:extLst>
+      <p:ext uri="{BB962C8B-B14F-4D97-AF65-F5344CB8AC3E}">
+        <p14:creationId xmlns:p14="http://schemas.microsoft.com/office/powerpoint/2010/main" val="1991186185"/>
+      </p:ext>
+    </p:extLst>
+  </p:cSld>
+  <p:clrMapOvr>
+    <a:masterClrMapping/>
+  </p:clrMapOvr>
+</p:sld>
+</file>
+
+<file path=ppt/slides/slide14.xml><?xml version="1.0" encoding="utf-8"?>
+<p:sld xmlns:a="http://schemas.openxmlformats.org/drawingml/2006/main" xmlns:r="http://schemas.openxmlformats.org/officeDocument/2006/relationships" xmlns:p="http://schemas.openxmlformats.org/presentationml/2006/main">
+  <p:cSld>
+    <p:spTree>
+      <p:nvGrpSpPr>
+        <p:cNvPr id="1" name=""/>
+        <p:cNvGrpSpPr/>
+        <p:nvPr/>
+      </p:nvGrpSpPr>
+      <p:grpSpPr>
+        <a:xfrm>
+          <a:off x="0" y="0"/>
+          <a:ext cx="0" cy="0"/>
+          <a:chOff x="0" y="0"/>
+          <a:chExt cx="0" cy="0"/>
+        </a:xfrm>
+      </p:grpSpPr>
+      <p:sp>
+        <p:nvSpPr>
+          <p:cNvPr id="2" name="Title 1">
+            <a:extLst>
+              <a:ext uri="{FF2B5EF4-FFF2-40B4-BE49-F238E27FC236}">
+                <a16:creationId xmlns:a16="http://schemas.microsoft.com/office/drawing/2014/main" id="{A45BF3FC-B5FE-3BED-EB28-4FC2D7EDCAA2}"/>
+              </a:ext>
+            </a:extLst>
+          </p:cNvPr>
+          <p:cNvSpPr>
+            <a:spLocks noGrp="1"/>
+          </p:cNvSpPr>
+          <p:nvPr>
+            <p:ph type="title"/>
+          </p:nvPr>
+        </p:nvSpPr>
+        <p:spPr>
+          <a:xfrm>
+            <a:off x="1" y="307777"/>
+            <a:ext cx="10080624" cy="1095796"/>
+          </a:xfrm>
+        </p:spPr>
+        <p:txBody>
+          <a:bodyPr/>
+          <a:lstStyle/>
+          <a:p>
+            <a:r>
+              <a:rPr lang="en-CZ" dirty="0"/>
+              <a:t>Využití zdrojů PL</a:t>
+            </a:r>
+          </a:p>
+        </p:txBody>
+      </p:sp>
+      <p:cxnSp>
+        <p:nvCxnSpPr>
+          <p:cNvPr id="14" name="Straight Arrow Connector 13">
+            <a:extLst>
+              <a:ext uri="{FF2B5EF4-FFF2-40B4-BE49-F238E27FC236}">
+                <a16:creationId xmlns:a16="http://schemas.microsoft.com/office/drawing/2014/main" id="{2ACB3162-3279-9B18-6B5B-54DB7EC9C0D4}"/>
+              </a:ext>
+            </a:extLst>
+          </p:cNvPr>
+          <p:cNvCxnSpPr/>
+          <p:nvPr/>
+        </p:nvCxnSpPr>
+        <p:spPr bwMode="auto">
+          <a:xfrm>
+            <a:off x="6264449" y="2808630"/>
+            <a:ext cx="360039" cy="360039"/>
+          </a:xfrm>
+          <a:prstGeom prst="straightConnector1">
+            <a:avLst/>
+          </a:prstGeom>
+          <a:solidFill>
+            <a:srgbClr val="00B8FF"/>
+          </a:solidFill>
+          <a:ln w="53975" cap="flat" cmpd="sng" algn="ctr">
+            <a:solidFill>
+              <a:srgbClr val="C00000"/>
+            </a:solidFill>
+            <a:prstDash val="solid"/>
+            <a:round/>
+            <a:headEnd type="triangle"/>
+            <a:tailEnd type="triangle"/>
+          </a:ln>
+          <a:effectLst/>
+          <a:extLst>
+            <a:ext uri="{AF507438-7753-43E0-B8FC-AC1667EBCBE1}">
+              <a14:hiddenEffects xmlns:a14="http://schemas.microsoft.com/office/drawing/2010/main">
+                <a:effectLst>
+                  <a:outerShdw dist="35921" dir="2700000" algn="ctr" rotWithShape="0">
+                    <a:schemeClr val="bg2"/>
+                  </a:outerShdw>
+                </a:effectLst>
+              </a14:hiddenEffects>
+            </a:ext>
+          </a:extLst>
+        </p:spPr>
+      </p:cxnSp>
+      <p:pic>
+        <p:nvPicPr>
+          <p:cNvPr id="17" name="Picture 16" descr="Table&#10;&#10;Description automatically generated">
+            <a:extLst>
+              <a:ext uri="{FF2B5EF4-FFF2-40B4-BE49-F238E27FC236}">
+                <a16:creationId xmlns:a16="http://schemas.microsoft.com/office/drawing/2014/main" id="{AB517B87-2DB7-5DC8-2A78-19FF71308160}"/>
+              </a:ext>
+            </a:extLst>
+          </p:cNvPr>
+          <p:cNvPicPr>
+            <a:picLocks noChangeAspect="1"/>
+          </p:cNvPicPr>
+          <p:nvPr/>
+        </p:nvPicPr>
+        <p:blipFill>
+          <a:blip r:embed="rId3">
+            <a:extLst>
+              <a:ext uri="{28A0092B-C50C-407E-A947-70E740481C1C}">
+                <a14:useLocalDpi xmlns:a14="http://schemas.microsoft.com/office/drawing/2010/main" val="0"/>
+              </a:ext>
+            </a:extLst>
+          </a:blip>
+          <a:stretch>
+            <a:fillRect/>
+          </a:stretch>
+        </p:blipFill>
+        <p:spPr>
+          <a:xfrm>
+            <a:off x="1154112" y="2808630"/>
+            <a:ext cx="7772400" cy="1528671"/>
+          </a:xfrm>
+          <a:prstGeom prst="rect">
+            <a:avLst/>
+          </a:prstGeom>
+        </p:spPr>
+      </p:pic>
+    </p:spTree>
+    <p:extLst>
+      <p:ext uri="{BB962C8B-B14F-4D97-AF65-F5344CB8AC3E}">
+        <p14:creationId xmlns:p14="http://schemas.microsoft.com/office/powerpoint/2010/main" val="3895337258"/>
       </p:ext>
     </p:extLst>
   </p:cSld>
@@ -16936,105 +17135,6 @@
           <a:p>
             <a:r>
               <a:rPr lang="en-CZ" dirty="0"/>
-              <a:t>Ukázka aplikace – FOC simulace</a:t>
-            </a:r>
-          </a:p>
-        </p:txBody>
-      </p:sp>
-      <p:pic>
-        <p:nvPicPr>
-          <p:cNvPr id="5" name="Picture 4">
-            <a:extLst>
-              <a:ext uri="{FF2B5EF4-FFF2-40B4-BE49-F238E27FC236}">
-                <a16:creationId xmlns:a16="http://schemas.microsoft.com/office/drawing/2014/main" id="{FED84642-3727-77A8-4809-8C2E1CB42997}"/>
-              </a:ext>
-            </a:extLst>
-          </p:cNvPr>
-          <p:cNvPicPr>
-            <a:picLocks noChangeAspect="1"/>
-          </p:cNvPicPr>
-          <p:nvPr/>
-        </p:nvPicPr>
-        <p:blipFill>
-          <a:blip r:embed="rId2">
-            <a:extLst>
-              <a:ext uri="{28A0092B-C50C-407E-A947-70E740481C1C}">
-                <a14:useLocalDpi xmlns:a14="http://schemas.microsoft.com/office/drawing/2010/main" val="0"/>
-              </a:ext>
-            </a:extLst>
-          </a:blip>
-          <a:stretch>
-            <a:fillRect/>
-          </a:stretch>
-        </p:blipFill>
-        <p:spPr>
-          <a:xfrm>
-            <a:off x="1205020" y="1423773"/>
-            <a:ext cx="7670584" cy="5688632"/>
-          </a:xfrm>
-          <a:prstGeom prst="rect">
-            <a:avLst/>
-          </a:prstGeom>
-        </p:spPr>
-      </p:pic>
-    </p:spTree>
-    <p:extLst>
-      <p:ext uri="{BB962C8B-B14F-4D97-AF65-F5344CB8AC3E}">
-        <p14:creationId xmlns:p14="http://schemas.microsoft.com/office/powerpoint/2010/main" val="4039502850"/>
-      </p:ext>
-    </p:extLst>
-  </p:cSld>
-  <p:clrMapOvr>
-    <a:masterClrMapping/>
-  </p:clrMapOvr>
-</p:sld>
-</file>
-
-<file path=ppt/slides/slide5.xml><?xml version="1.0" encoding="utf-8"?>
-<p:sld xmlns:a="http://schemas.openxmlformats.org/drawingml/2006/main" xmlns:r="http://schemas.openxmlformats.org/officeDocument/2006/relationships" xmlns:p="http://schemas.openxmlformats.org/presentationml/2006/main">
-  <p:cSld>
-    <p:spTree>
-      <p:nvGrpSpPr>
-        <p:cNvPr id="1" name=""/>
-        <p:cNvGrpSpPr/>
-        <p:nvPr/>
-      </p:nvGrpSpPr>
-      <p:grpSpPr>
-        <a:xfrm>
-          <a:off x="0" y="0"/>
-          <a:ext cx="0" cy="0"/>
-          <a:chOff x="0" y="0"/>
-          <a:chExt cx="0" cy="0"/>
-        </a:xfrm>
-      </p:grpSpPr>
-      <p:sp>
-        <p:nvSpPr>
-          <p:cNvPr id="2" name="Title 1">
-            <a:extLst>
-              <a:ext uri="{FF2B5EF4-FFF2-40B4-BE49-F238E27FC236}">
-                <a16:creationId xmlns:a16="http://schemas.microsoft.com/office/drawing/2014/main" id="{A45BF3FC-B5FE-3BED-EB28-4FC2D7EDCAA2}"/>
-              </a:ext>
-            </a:extLst>
-          </p:cNvPr>
-          <p:cNvSpPr>
-            <a:spLocks noGrp="1"/>
-          </p:cNvSpPr>
-          <p:nvPr>
-            <p:ph type="title"/>
-          </p:nvPr>
-        </p:nvSpPr>
-        <p:spPr>
-          <a:xfrm>
-            <a:off x="1" y="307777"/>
-            <a:ext cx="10080624" cy="1095796"/>
-          </a:xfrm>
-        </p:spPr>
-        <p:txBody>
-          <a:bodyPr/>
-          <a:lstStyle/>
-          <a:p>
-            <a:r>
-              <a:rPr lang="en-CZ" dirty="0"/>
               <a:t>Realizace aplikace</a:t>
             </a:r>
           </a:p>
@@ -17089,383 +17189,7 @@
 </p:sld>
 </file>
 
-<file path=ppt/slides/slide6.xml><?xml version="1.0" encoding="utf-8"?>
-<p:sld xmlns:a="http://schemas.openxmlformats.org/drawingml/2006/main" xmlns:r="http://schemas.openxmlformats.org/officeDocument/2006/relationships" xmlns:p="http://schemas.openxmlformats.org/presentationml/2006/main">
-  <p:cSld>
-    <p:spTree>
-      <p:nvGrpSpPr>
-        <p:cNvPr id="1" name=""/>
-        <p:cNvGrpSpPr/>
-        <p:nvPr/>
-      </p:nvGrpSpPr>
-      <p:grpSpPr>
-        <a:xfrm>
-          <a:off x="0" y="0"/>
-          <a:ext cx="0" cy="0"/>
-          <a:chOff x="0" y="0"/>
-          <a:chExt cx="0" cy="0"/>
-        </a:xfrm>
-      </p:grpSpPr>
-      <p:sp>
-        <p:nvSpPr>
-          <p:cNvPr id="2" name="Title 1">
-            <a:extLst>
-              <a:ext uri="{FF2B5EF4-FFF2-40B4-BE49-F238E27FC236}">
-                <a16:creationId xmlns:a16="http://schemas.microsoft.com/office/drawing/2014/main" id="{A45BF3FC-B5FE-3BED-EB28-4FC2D7EDCAA2}"/>
-              </a:ext>
-            </a:extLst>
-          </p:cNvPr>
-          <p:cNvSpPr>
-            <a:spLocks noGrp="1"/>
-          </p:cNvSpPr>
-          <p:nvPr>
-            <p:ph type="title"/>
-          </p:nvPr>
-        </p:nvSpPr>
-        <p:spPr>
-          <a:xfrm>
-            <a:off x="1" y="307777"/>
-            <a:ext cx="10080624" cy="1095796"/>
-          </a:xfrm>
-        </p:spPr>
-        <p:txBody>
-          <a:bodyPr/>
-          <a:lstStyle/>
-          <a:p>
-            <a:r>
-              <a:rPr lang="en-CZ" dirty="0"/>
-              <a:t>Analýza běhu aplikace</a:t>
-            </a:r>
-          </a:p>
-        </p:txBody>
-      </p:sp>
-      <p:pic>
-        <p:nvPicPr>
-          <p:cNvPr id="4" name="Picture 3" descr="A picture containing chart&#10;&#10;Description automatically generated">
-            <a:extLst>
-              <a:ext uri="{FF2B5EF4-FFF2-40B4-BE49-F238E27FC236}">
-                <a16:creationId xmlns:a16="http://schemas.microsoft.com/office/drawing/2014/main" id="{AEEA3901-28F7-D559-4629-AF3EB3399A20}"/>
-              </a:ext>
-            </a:extLst>
-          </p:cNvPr>
-          <p:cNvPicPr>
-            <a:picLocks noChangeAspect="1"/>
-          </p:cNvPicPr>
-          <p:nvPr/>
-        </p:nvPicPr>
-        <p:blipFill>
-          <a:blip r:embed="rId3">
-            <a:extLst>
-              <a:ext uri="{28A0092B-C50C-407E-A947-70E740481C1C}">
-                <a14:useLocalDpi xmlns:a14="http://schemas.microsoft.com/office/drawing/2010/main" val="0"/>
-              </a:ext>
-            </a:extLst>
-          </a:blip>
-          <a:stretch>
-            <a:fillRect/>
-          </a:stretch>
-        </p:blipFill>
-        <p:spPr>
-          <a:xfrm>
-            <a:off x="19368" y="1643714"/>
-            <a:ext cx="9845479" cy="5608184"/>
-          </a:xfrm>
-          <a:prstGeom prst="rect">
-            <a:avLst/>
-          </a:prstGeom>
-        </p:spPr>
-      </p:pic>
-      <p:sp>
-        <p:nvSpPr>
-          <p:cNvPr id="5" name="Nadpis 1">
-            <a:extLst>
-              <a:ext uri="{FF2B5EF4-FFF2-40B4-BE49-F238E27FC236}">
-                <a16:creationId xmlns:a16="http://schemas.microsoft.com/office/drawing/2014/main" id="{8E674679-081B-AA64-ACFD-A9A29B3FF42A}"/>
-              </a:ext>
-            </a:extLst>
-          </p:cNvPr>
-          <p:cNvSpPr txBox="1">
-            <a:spLocks/>
-          </p:cNvSpPr>
-          <p:nvPr/>
-        </p:nvSpPr>
-        <p:spPr bwMode="auto">
-          <a:xfrm>
-            <a:off x="143768" y="1187549"/>
-            <a:ext cx="9793087" cy="432048"/>
-          </a:xfrm>
-          <a:prstGeom prst="rect">
-            <a:avLst/>
-          </a:prstGeom>
-          <a:noFill/>
-          <a:ln w="9525">
-            <a:noFill/>
-            <a:round/>
-            <a:headEnd/>
-            <a:tailEnd/>
-          </a:ln>
-          <a:effectLst/>
-          <a:extLst>
-            <a:ext uri="{909E8E84-426E-40DD-AFC4-6F175D3DCCD1}">
-              <a14:hiddenFill xmlns:a14="http://schemas.microsoft.com/office/drawing/2010/main">
-                <a:solidFill>
-                  <a:srgbClr val="FFFFFF"/>
-                </a:solidFill>
-              </a14:hiddenFill>
-            </a:ext>
-            <a:ext uri="{AF507438-7753-43E0-B8FC-AC1667EBCBE1}">
-              <a14:hiddenEffects xmlns:a14="http://schemas.microsoft.com/office/drawing/2010/main">
-                <a:effectLst>
-                  <a:outerShdw dist="35921" dir="2700000" algn="ctr" rotWithShape="0">
-                    <a:schemeClr val="bg2"/>
-                  </a:outerShdw>
-                </a:effectLst>
-              </a14:hiddenEffects>
-            </a:ext>
-          </a:extLst>
-        </p:spPr>
-        <p:txBody>
-          <a:bodyPr vert="horz" wrap="square" lIns="0" tIns="0" rIns="0" bIns="0" numCol="1" anchor="ctr" anchorCtr="0" compatLnSpc="1">
-            <a:prstTxWarp prst="textNoShape">
-              <a:avLst/>
-            </a:prstTxWarp>
-          </a:bodyPr>
-          <a:lstStyle>
-            <a:lvl1pPr algn="ctr" defTabSz="449263" rtl="0" eaLnBrk="0" fontAlgn="base" hangingPunct="0">
-              <a:lnSpc>
-                <a:spcPct val="93000"/>
-              </a:lnSpc>
-              <a:spcBef>
-                <a:spcPct val="0"/>
-              </a:spcBef>
-              <a:spcAft>
-                <a:spcPct val="0"/>
-              </a:spcAft>
-              <a:buClr>
-                <a:srgbClr val="000000"/>
-              </a:buClr>
-              <a:buSzPct val="100000"/>
-              <a:buFont typeface="Times New Roman" panose="02020603050405020304" pitchFamily="18" charset="0"/>
-              <a:defRPr sz="4000" kern="1200" cap="all" baseline="0">
-                <a:solidFill>
-                  <a:srgbClr val="005EB8"/>
-                </a:solidFill>
-                <a:latin typeface="Technika" panose="00000500000000000000" pitchFamily="2" charset="-18"/>
-                <a:ea typeface="Technika" panose="00000500000000000000" pitchFamily="2" charset="-18"/>
-                <a:cs typeface="Technika" panose="00000500000000000000" pitchFamily="2" charset="-18"/>
-              </a:defRPr>
-            </a:lvl1pPr>
-            <a:lvl2pPr algn="ctr" defTabSz="449263" rtl="0" eaLnBrk="0" fontAlgn="base" hangingPunct="0">
-              <a:lnSpc>
-                <a:spcPct val="93000"/>
-              </a:lnSpc>
-              <a:spcBef>
-                <a:spcPct val="0"/>
-              </a:spcBef>
-              <a:spcAft>
-                <a:spcPct val="0"/>
-              </a:spcAft>
-              <a:buClr>
-                <a:srgbClr val="000000"/>
-              </a:buClr>
-              <a:buSzPct val="100000"/>
-              <a:buFont typeface="Times New Roman" panose="02020603050405020304" pitchFamily="18" charset="0"/>
-              <a:defRPr sz="4400">
-                <a:solidFill>
-                  <a:srgbClr val="000000"/>
-                </a:solidFill>
-                <a:latin typeface="Liberation Sans" panose="020B0604020202020204" pitchFamily="34" charset="0"/>
-                <a:cs typeface="Liberation Sans" panose="020B0604020202020204" pitchFamily="34" charset="0"/>
-              </a:defRPr>
-            </a:lvl2pPr>
-            <a:lvl3pPr algn="ctr" defTabSz="449263" rtl="0" eaLnBrk="0" fontAlgn="base" hangingPunct="0">
-              <a:lnSpc>
-                <a:spcPct val="93000"/>
-              </a:lnSpc>
-              <a:spcBef>
-                <a:spcPct val="0"/>
-              </a:spcBef>
-              <a:spcAft>
-                <a:spcPct val="0"/>
-              </a:spcAft>
-              <a:buClr>
-                <a:srgbClr val="000000"/>
-              </a:buClr>
-              <a:buSzPct val="100000"/>
-              <a:buFont typeface="Times New Roman" panose="02020603050405020304" pitchFamily="18" charset="0"/>
-              <a:defRPr sz="4400">
-                <a:solidFill>
-                  <a:srgbClr val="000000"/>
-                </a:solidFill>
-                <a:latin typeface="Liberation Sans" panose="020B0604020202020204" pitchFamily="34" charset="0"/>
-                <a:cs typeface="Liberation Sans" panose="020B0604020202020204" pitchFamily="34" charset="0"/>
-              </a:defRPr>
-            </a:lvl3pPr>
-            <a:lvl4pPr algn="ctr" defTabSz="449263" rtl="0" eaLnBrk="0" fontAlgn="base" hangingPunct="0">
-              <a:lnSpc>
-                <a:spcPct val="93000"/>
-              </a:lnSpc>
-              <a:spcBef>
-                <a:spcPct val="0"/>
-              </a:spcBef>
-              <a:spcAft>
-                <a:spcPct val="0"/>
-              </a:spcAft>
-              <a:buClr>
-                <a:srgbClr val="000000"/>
-              </a:buClr>
-              <a:buSzPct val="100000"/>
-              <a:buFont typeface="Times New Roman" panose="02020603050405020304" pitchFamily="18" charset="0"/>
-              <a:defRPr sz="4400">
-                <a:solidFill>
-                  <a:srgbClr val="000000"/>
-                </a:solidFill>
-                <a:latin typeface="Liberation Sans" panose="020B0604020202020204" pitchFamily="34" charset="0"/>
-                <a:cs typeface="Liberation Sans" panose="020B0604020202020204" pitchFamily="34" charset="0"/>
-              </a:defRPr>
-            </a:lvl4pPr>
-            <a:lvl5pPr algn="ctr" defTabSz="449263" rtl="0" eaLnBrk="0" fontAlgn="base" hangingPunct="0">
-              <a:lnSpc>
-                <a:spcPct val="93000"/>
-              </a:lnSpc>
-              <a:spcBef>
-                <a:spcPct val="0"/>
-              </a:spcBef>
-              <a:spcAft>
-                <a:spcPct val="0"/>
-              </a:spcAft>
-              <a:buClr>
-                <a:srgbClr val="000000"/>
-              </a:buClr>
-              <a:buSzPct val="100000"/>
-              <a:buFont typeface="Times New Roman" panose="02020603050405020304" pitchFamily="18" charset="0"/>
-              <a:defRPr sz="4400">
-                <a:solidFill>
-                  <a:srgbClr val="000000"/>
-                </a:solidFill>
-                <a:latin typeface="Liberation Sans" panose="020B0604020202020204" pitchFamily="34" charset="0"/>
-                <a:cs typeface="Liberation Sans" panose="020B0604020202020204" pitchFamily="34" charset="0"/>
-              </a:defRPr>
-            </a:lvl5pPr>
-            <a:lvl6pPr marL="2514600" indent="-228600" algn="ctr" defTabSz="449263" rtl="0" fontAlgn="base" hangingPunct="0">
-              <a:lnSpc>
-                <a:spcPct val="93000"/>
-              </a:lnSpc>
-              <a:spcBef>
-                <a:spcPct val="0"/>
-              </a:spcBef>
-              <a:spcAft>
-                <a:spcPct val="0"/>
-              </a:spcAft>
-              <a:buClr>
-                <a:srgbClr val="000000"/>
-              </a:buClr>
-              <a:buSzPct val="100000"/>
-              <a:buFont typeface="Times New Roman" panose="02020603050405020304" pitchFamily="18" charset="0"/>
-              <a:defRPr sz="4400">
-                <a:solidFill>
-                  <a:srgbClr val="000000"/>
-                </a:solidFill>
-                <a:latin typeface="Arial" panose="020B0604020202020204" pitchFamily="34" charset="0"/>
-                <a:cs typeface="WenQuanYi Zen Hei" charset="0"/>
-              </a:defRPr>
-            </a:lvl6pPr>
-            <a:lvl7pPr marL="2971800" indent="-228600" algn="ctr" defTabSz="449263" rtl="0" fontAlgn="base" hangingPunct="0">
-              <a:lnSpc>
-                <a:spcPct val="93000"/>
-              </a:lnSpc>
-              <a:spcBef>
-                <a:spcPct val="0"/>
-              </a:spcBef>
-              <a:spcAft>
-                <a:spcPct val="0"/>
-              </a:spcAft>
-              <a:buClr>
-                <a:srgbClr val="000000"/>
-              </a:buClr>
-              <a:buSzPct val="100000"/>
-              <a:buFont typeface="Times New Roman" panose="02020603050405020304" pitchFamily="18" charset="0"/>
-              <a:defRPr sz="4400">
-                <a:solidFill>
-                  <a:srgbClr val="000000"/>
-                </a:solidFill>
-                <a:latin typeface="Arial" panose="020B0604020202020204" pitchFamily="34" charset="0"/>
-                <a:cs typeface="WenQuanYi Zen Hei" charset="0"/>
-              </a:defRPr>
-            </a:lvl7pPr>
-            <a:lvl8pPr marL="3429000" indent="-228600" algn="ctr" defTabSz="449263" rtl="0" fontAlgn="base" hangingPunct="0">
-              <a:lnSpc>
-                <a:spcPct val="93000"/>
-              </a:lnSpc>
-              <a:spcBef>
-                <a:spcPct val="0"/>
-              </a:spcBef>
-              <a:spcAft>
-                <a:spcPct val="0"/>
-              </a:spcAft>
-              <a:buClr>
-                <a:srgbClr val="000000"/>
-              </a:buClr>
-              <a:buSzPct val="100000"/>
-              <a:buFont typeface="Times New Roman" panose="02020603050405020304" pitchFamily="18" charset="0"/>
-              <a:defRPr sz="4400">
-                <a:solidFill>
-                  <a:srgbClr val="000000"/>
-                </a:solidFill>
-                <a:latin typeface="Arial" panose="020B0604020202020204" pitchFamily="34" charset="0"/>
-                <a:cs typeface="WenQuanYi Zen Hei" charset="0"/>
-              </a:defRPr>
-            </a:lvl8pPr>
-            <a:lvl9pPr marL="3886200" indent="-228600" algn="ctr" defTabSz="449263" rtl="0" fontAlgn="base" hangingPunct="0">
-              <a:lnSpc>
-                <a:spcPct val="93000"/>
-              </a:lnSpc>
-              <a:spcBef>
-                <a:spcPct val="0"/>
-              </a:spcBef>
-              <a:spcAft>
-                <a:spcPct val="0"/>
-              </a:spcAft>
-              <a:buClr>
-                <a:srgbClr val="000000"/>
-              </a:buClr>
-              <a:buSzPct val="100000"/>
-              <a:buFont typeface="Times New Roman" panose="02020603050405020304" pitchFamily="18" charset="0"/>
-              <a:defRPr sz="4400">
-                <a:solidFill>
-                  <a:srgbClr val="000000"/>
-                </a:solidFill>
-                <a:latin typeface="Arial" panose="020B0604020202020204" pitchFamily="34" charset="0"/>
-                <a:cs typeface="WenQuanYi Zen Hei" charset="0"/>
-              </a:defRPr>
-            </a:lvl9pPr>
-          </a:lstStyle>
-          <a:p>
-            <a:r>
-              <a:rPr lang="cs-CZ" sz="2000" b="1" i="1" dirty="0">
-                <a:solidFill>
-                  <a:srgbClr val="E05206"/>
-                </a:solidFill>
-              </a:rPr>
-              <a:t>CPU/FPGA Model</a:t>
-            </a:r>
-          </a:p>
-        </p:txBody>
-      </p:sp>
-    </p:spTree>
-    <p:extLst>
-      <p:ext uri="{BB962C8B-B14F-4D97-AF65-F5344CB8AC3E}">
-        <p14:creationId xmlns:p14="http://schemas.microsoft.com/office/powerpoint/2010/main" val="1991186185"/>
-      </p:ext>
-    </p:extLst>
-  </p:cSld>
-  <p:clrMapOvr>
-    <a:masterClrMapping/>
-  </p:clrMapOvr>
-</p:sld>
-</file>
-
-<file path=ppt/slides/slide7.xml><?xml version="1.0" encoding="utf-8"?>
+<file path=ppt/slides/slide5.xml><?xml version="1.0" encoding="utf-8"?>
 <p:sld xmlns:a="http://schemas.openxmlformats.org/drawingml/2006/main" xmlns:r="http://schemas.openxmlformats.org/officeDocument/2006/relationships" xmlns:p="http://schemas.openxmlformats.org/presentationml/2006/main">
   <p:cSld>
     <p:spTree>
@@ -17794,6 +17518,198 @@
 </p:sld>
 </file>
 
+<file path=ppt/slides/slide6.xml><?xml version="1.0" encoding="utf-8"?>
+<p:sld xmlns:a="http://schemas.openxmlformats.org/drawingml/2006/main" xmlns:r="http://schemas.openxmlformats.org/officeDocument/2006/relationships" xmlns:p="http://schemas.openxmlformats.org/presentationml/2006/main">
+  <p:cSld>
+    <p:spTree>
+      <p:nvGrpSpPr>
+        <p:cNvPr id="1" name=""/>
+        <p:cNvGrpSpPr/>
+        <p:nvPr/>
+      </p:nvGrpSpPr>
+      <p:grpSpPr>
+        <a:xfrm>
+          <a:off x="0" y="0"/>
+          <a:ext cx="0" cy="0"/>
+          <a:chOff x="0" y="0"/>
+          <a:chExt cx="0" cy="0"/>
+        </a:xfrm>
+      </p:grpSpPr>
+      <p:sp>
+        <p:nvSpPr>
+          <p:cNvPr id="3" name="Zástupný obsah 2">
+            <a:extLst>
+              <a:ext uri="{FF2B5EF4-FFF2-40B4-BE49-F238E27FC236}">
+                <a16:creationId xmlns:a16="http://schemas.microsoft.com/office/drawing/2014/main" id="{4C8D8D05-90FB-4548-9CEA-44E94AA1162E}"/>
+              </a:ext>
+            </a:extLst>
+          </p:cNvPr>
+          <p:cNvSpPr>
+            <a:spLocks noGrp="1"/>
+          </p:cNvSpPr>
+          <p:nvPr>
+            <p:ph idx="1"/>
+          </p:nvPr>
+        </p:nvSpPr>
+        <p:spPr>
+          <a:xfrm>
+            <a:off x="628095" y="3366952"/>
+            <a:ext cx="8824433" cy="825769"/>
+          </a:xfrm>
+        </p:spPr>
+        <p:txBody>
+          <a:bodyPr/>
+          <a:lstStyle/>
+          <a:p>
+            <a:pPr marL="0" indent="0" algn="ctr">
+              <a:buNone/>
+            </a:pPr>
+            <a:r>
+              <a:rPr lang="cs-CZ" sz="4400" noProof="0" dirty="0">
+                <a:solidFill>
+                  <a:srgbClr val="005EB8"/>
+                </a:solidFill>
+                <a:latin typeface="Technika" panose="00000500000000000000" pitchFamily="2" charset="-18"/>
+              </a:rPr>
+              <a:t>Děkuji za pozornost</a:t>
+            </a:r>
+            <a:r>
+              <a:rPr lang="cs-CZ" sz="4400" dirty="0">
+                <a:solidFill>
+                  <a:srgbClr val="005EB8"/>
+                </a:solidFill>
+                <a:latin typeface="Technika" panose="00000500000000000000" pitchFamily="2" charset="-18"/>
+              </a:rPr>
+              <a:t>.</a:t>
+            </a:r>
+            <a:endParaRPr lang="en-US" sz="4400" noProof="0" dirty="0">
+              <a:solidFill>
+                <a:srgbClr val="005EB8"/>
+              </a:solidFill>
+              <a:latin typeface="Technika" panose="00000500000000000000" pitchFamily="2" charset="-18"/>
+            </a:endParaRPr>
+          </a:p>
+        </p:txBody>
+      </p:sp>
+    </p:spTree>
+    <p:extLst>
+      <p:ext uri="{BB962C8B-B14F-4D97-AF65-F5344CB8AC3E}">
+        <p14:creationId xmlns:p14="http://schemas.microsoft.com/office/powerpoint/2010/main" val="1230451900"/>
+      </p:ext>
+    </p:extLst>
+  </p:cSld>
+  <p:clrMapOvr>
+    <a:masterClrMapping/>
+  </p:clrMapOvr>
+</p:sld>
+</file>
+
+<file path=ppt/slides/slide7.xml><?xml version="1.0" encoding="utf-8"?>
+<p:sld xmlns:a="http://schemas.openxmlformats.org/drawingml/2006/main" xmlns:r="http://schemas.openxmlformats.org/officeDocument/2006/relationships" xmlns:p="http://schemas.openxmlformats.org/presentationml/2006/main">
+  <p:cSld>
+    <p:spTree>
+      <p:nvGrpSpPr>
+        <p:cNvPr id="1" name=""/>
+        <p:cNvGrpSpPr/>
+        <p:nvPr/>
+      </p:nvGrpSpPr>
+      <p:grpSpPr>
+        <a:xfrm>
+          <a:off x="0" y="0"/>
+          <a:ext cx="0" cy="0"/>
+          <a:chOff x="0" y="0"/>
+          <a:chExt cx="0" cy="0"/>
+        </a:xfrm>
+      </p:grpSpPr>
+      <p:sp>
+        <p:nvSpPr>
+          <p:cNvPr id="4" name="Rectangle 3">
+            <a:extLst>
+              <a:ext uri="{FF2B5EF4-FFF2-40B4-BE49-F238E27FC236}">
+                <a16:creationId xmlns:a16="http://schemas.microsoft.com/office/drawing/2014/main" id="{CBC4BD6D-D679-68FE-29B9-86A257FF02AF}"/>
+              </a:ext>
+            </a:extLst>
+          </p:cNvPr>
+          <p:cNvSpPr/>
+          <p:nvPr/>
+        </p:nvSpPr>
+        <p:spPr bwMode="auto">
+          <a:xfrm>
+            <a:off x="0" y="0"/>
+            <a:ext cx="10080625" cy="7559675"/>
+          </a:xfrm>
+          <a:prstGeom prst="rect">
+            <a:avLst/>
+          </a:prstGeom>
+          <a:solidFill>
+            <a:schemeClr val="tx1"/>
+          </a:solidFill>
+          <a:ln w="9525" cap="flat" cmpd="sng" algn="ctr">
+            <a:solidFill>
+              <a:schemeClr val="tx1"/>
+            </a:solidFill>
+            <a:prstDash val="solid"/>
+            <a:round/>
+            <a:headEnd type="none" w="med" len="med"/>
+            <a:tailEnd type="none" w="med" len="med"/>
+          </a:ln>
+          <a:effectLst/>
+        </p:spPr>
+        <p:txBody>
+          <a:bodyPr vert="horz" wrap="square" lIns="91440" tIns="45720" rIns="91440" bIns="45720" numCol="1" rtlCol="0" anchor="t" anchorCtr="0" compatLnSpc="1">
+            <a:prstTxWarp prst="textNoShape">
+              <a:avLst/>
+            </a:prstTxWarp>
+          </a:bodyPr>
+          <a:lstStyle/>
+          <a:p>
+            <a:pPr marL="0" marR="0" indent="0" algn="l" defTabSz="449263" rtl="0" eaLnBrk="1" fontAlgn="base" latinLnBrk="0" hangingPunct="0">
+              <a:lnSpc>
+                <a:spcPct val="93000"/>
+              </a:lnSpc>
+              <a:spcBef>
+                <a:spcPct val="0"/>
+              </a:spcBef>
+              <a:spcAft>
+                <a:spcPct val="0"/>
+              </a:spcAft>
+              <a:buClr>
+                <a:srgbClr val="000000"/>
+              </a:buClr>
+              <a:buSzPct val="100000"/>
+              <a:buFont typeface="Times New Roman" panose="02020603050405020304" pitchFamily="18" charset="0"/>
+              <a:buNone/>
+              <a:tabLst/>
+            </a:pPr>
+            <a:endParaRPr kumimoji="0" lang="en-CZ" sz="1800" b="0" i="0" u="none" strike="noStrike" cap="none" normalizeH="0" baseline="0" dirty="0">
+              <a:ln>
+                <a:solidFill>
+                  <a:sysClr val="windowText" lastClr="000000"/>
+                </a:solidFill>
+              </a:ln>
+              <a:solidFill>
+                <a:srgbClr val="E05206"/>
+              </a:solidFill>
+              <a:effectLst/>
+              <a:latin typeface="Arial" panose="020B0604020202020204" pitchFamily="34" charset="0"/>
+              <a:cs typeface="WenQuanYi Zen Hei" charset="0"/>
+            </a:endParaRPr>
+          </a:p>
+        </p:txBody>
+      </p:sp>
+    </p:spTree>
+    <p:extLst>
+      <p:ext uri="{BB962C8B-B14F-4D97-AF65-F5344CB8AC3E}">
+        <p14:creationId xmlns:p14="http://schemas.microsoft.com/office/powerpoint/2010/main" val="2197704723"/>
+      </p:ext>
+    </p:extLst>
+  </p:cSld>
+  <p:clrMapOvr>
+    <a:masterClrMapping/>
+  </p:clrMapOvr>
+</p:sld>
+</file>
+
 <file path=ppt/slides/slide8.xml><?xml version="1.0" encoding="utf-8"?>
 <p:sld xmlns:a="http://schemas.openxmlformats.org/drawingml/2006/main" xmlns:r="http://schemas.openxmlformats.org/officeDocument/2006/relationships" xmlns:p="http://schemas.openxmlformats.org/presentationml/2006/main">
   <p:cSld>
@@ -17813,10 +17729,10 @@
       </p:grpSpPr>
       <p:sp>
         <p:nvSpPr>
-          <p:cNvPr id="2" name="Title 1">
+          <p:cNvPr id="2" name="Nadpis 1">
             <a:extLst>
               <a:ext uri="{FF2B5EF4-FFF2-40B4-BE49-F238E27FC236}">
-                <a16:creationId xmlns:a16="http://schemas.microsoft.com/office/drawing/2014/main" id="{A45BF3FC-B5FE-3BED-EB28-4FC2D7EDCAA2}"/>
+                <a16:creationId xmlns:a16="http://schemas.microsoft.com/office/drawing/2014/main" id="{50B1320F-8B04-28D1-3DC3-1D0E0863C753}"/>
               </a:ext>
             </a:extLst>
           </p:cNvPr>
@@ -17827,109 +17743,394 @@
             <p:ph type="title"/>
           </p:nvPr>
         </p:nvSpPr>
-        <p:spPr>
-          <a:xfrm>
-            <a:off x="1" y="307777"/>
-            <a:ext cx="10080624" cy="1095796"/>
-          </a:xfrm>
-        </p:spPr>
+        <p:spPr/>
         <p:txBody>
           <a:bodyPr/>
           <a:lstStyle/>
           <a:p>
             <a:r>
-              <a:rPr lang="en-CZ" dirty="0"/>
-              <a:t>Využití zdrojů PL</a:t>
+              <a:rPr lang="cs-CZ" dirty="0"/>
+              <a:t>Otázka č. 1</a:t>
             </a:r>
+            <a:endParaRPr lang="en-US" dirty="0"/>
           </a:p>
         </p:txBody>
       </p:sp>
-      <p:cxnSp>
-        <p:nvCxnSpPr>
-          <p:cNvPr id="14" name="Straight Arrow Connector 13">
-            <a:extLst>
-              <a:ext uri="{FF2B5EF4-FFF2-40B4-BE49-F238E27FC236}">
-                <a16:creationId xmlns:a16="http://schemas.microsoft.com/office/drawing/2014/main" id="{2ACB3162-3279-9B18-6B5B-54DB7EC9C0D4}"/>
-              </a:ext>
-            </a:extLst>
-          </p:cNvPr>
-          <p:cNvCxnSpPr/>
-          <p:nvPr/>
-        </p:nvCxnSpPr>
-        <p:spPr bwMode="auto">
-          <a:xfrm>
-            <a:off x="6264449" y="2808630"/>
-            <a:ext cx="360039" cy="360039"/>
-          </a:xfrm>
-          <a:prstGeom prst="straightConnector1">
-            <a:avLst/>
-          </a:prstGeom>
-          <a:solidFill>
-            <a:srgbClr val="00B8FF"/>
-          </a:solidFill>
-          <a:ln w="53975" cap="flat" cmpd="sng" algn="ctr">
-            <a:solidFill>
-              <a:srgbClr val="C00000"/>
-            </a:solidFill>
-            <a:prstDash val="solid"/>
-            <a:round/>
-            <a:headEnd type="triangle"/>
-            <a:tailEnd type="triangle"/>
-          </a:ln>
-          <a:effectLst/>
-          <a:extLst>
-            <a:ext uri="{AF507438-7753-43E0-B8FC-AC1667EBCBE1}">
-              <a14:hiddenEffects xmlns:a14="http://schemas.microsoft.com/office/drawing/2010/main">
-                <a:effectLst>
-                  <a:outerShdw dist="35921" dir="2700000" algn="ctr" rotWithShape="0">
-                    <a:schemeClr val="bg2"/>
-                  </a:outerShdw>
-                </a:effectLst>
-              </a14:hiddenEffects>
-            </a:ext>
-          </a:extLst>
-        </p:spPr>
-      </p:cxnSp>
-      <p:pic>
-        <p:nvPicPr>
-          <p:cNvPr id="17" name="Picture 16" descr="Table&#10;&#10;Description automatically generated">
-            <a:extLst>
-              <a:ext uri="{FF2B5EF4-FFF2-40B4-BE49-F238E27FC236}">
-                <a16:creationId xmlns:a16="http://schemas.microsoft.com/office/drawing/2014/main" id="{AB517B87-2DB7-5DC8-2A78-19FF71308160}"/>
-              </a:ext>
-            </a:extLst>
-          </p:cNvPr>
-          <p:cNvPicPr>
-            <a:picLocks noChangeAspect="1"/>
-          </p:cNvPicPr>
-          <p:nvPr/>
-        </p:nvPicPr>
-        <p:blipFill>
-          <a:blip r:embed="rId3">
-            <a:extLst>
-              <a:ext uri="{28A0092B-C50C-407E-A947-70E740481C1C}">
-                <a14:useLocalDpi xmlns:a14="http://schemas.microsoft.com/office/drawing/2010/main" val="0"/>
-              </a:ext>
-            </a:extLst>
-          </a:blip>
-          <a:stretch>
-            <a:fillRect/>
-          </a:stretch>
-        </p:blipFill>
-        <p:spPr>
-          <a:xfrm>
-            <a:off x="1154112" y="2808630"/>
-            <a:ext cx="7772400" cy="1528671"/>
-          </a:xfrm>
-          <a:prstGeom prst="rect">
-            <a:avLst/>
-          </a:prstGeom>
-        </p:spPr>
-      </p:pic>
+      <mc:AlternateContent xmlns:mc="http://schemas.openxmlformats.org/markup-compatibility/2006" xmlns:a14="http://schemas.microsoft.com/office/drawing/2010/main">
+        <mc:Choice Requires="a14">
+          <p:sp>
+            <p:nvSpPr>
+              <p:cNvPr id="3" name="Zástupný obsah 2">
+                <a:extLst>
+                  <a:ext uri="{FF2B5EF4-FFF2-40B4-BE49-F238E27FC236}">
+                    <a16:creationId xmlns:a16="http://schemas.microsoft.com/office/drawing/2014/main" id="{E7D969BC-ADF2-0ADD-9B62-A691718A88B3}"/>
+                  </a:ext>
+                </a:extLst>
+              </p:cNvPr>
+              <p:cNvSpPr>
+                <a:spLocks noGrp="1"/>
+              </p:cNvSpPr>
+              <p:nvPr>
+                <p:ph idx="1"/>
+              </p:nvPr>
+            </p:nvSpPr>
+            <p:spPr/>
+            <p:txBody>
+              <a:bodyPr/>
+              <a:lstStyle/>
+              <a:p>
+                <a:pPr marL="285750" indent="-285750">
+                  <a:buFont typeface="Arial" panose="020B0604020202020204" pitchFamily="34" charset="0"/>
+                  <a:buChar char="•"/>
+                </a:pPr>
+                <a:r>
+                  <a:rPr lang="cs-CZ" b="1" dirty="0">
+                    <a:solidFill>
+                      <a:srgbClr val="0050A0"/>
+                    </a:solidFill>
+                  </a:rPr>
+                  <a:t>Q</a:t>
+                </a:r>
+                <a:r>
+                  <a:rPr lang="cs-CZ" dirty="0">
+                    <a:solidFill>
+                      <a:srgbClr val="0050A0"/>
+                    </a:solidFill>
+                  </a:rPr>
+                  <a:t>: Objasněte formu zápisu rovnice (2.4-5).</a:t>
+                </a:r>
+              </a:p>
+              <a:p>
+                <a:pPr marL="285750" indent="-285750">
+                  <a:buFont typeface="Arial" panose="020B0604020202020204" pitchFamily="34" charset="0"/>
+                  <a:buChar char="•"/>
+                </a:pPr>
+                <a:r>
+                  <a:rPr lang="cs-CZ" b="1" dirty="0"/>
+                  <a:t>A</a:t>
+                </a:r>
+                <a:r>
+                  <a:rPr lang="cs-CZ" dirty="0"/>
+                  <a:t>: Jedná se o bohužel o překlep, který mi unikl. Napětí a proudy mají být samozřejmě v notaci prostorových vektorů. Správná forma je</a:t>
+                </a:r>
+              </a:p>
+              <a:p>
+                <a:pPr marL="0" indent="0">
+                  <a:buNone/>
+                </a:pPr>
+                <a14:m>
+                  <m:oMathPara xmlns:m="http://schemas.openxmlformats.org/officeDocument/2006/math">
+                    <m:oMathParaPr>
+                      <m:jc m:val="centerGroup"/>
+                    </m:oMathParaPr>
+                    <m:oMath xmlns:m="http://schemas.openxmlformats.org/officeDocument/2006/math">
+                      <m:sSubSup>
+                        <m:sSubSupPr>
+                          <m:ctrlPr>
+                            <a:rPr lang="en-US" i="1">
+                              <a:latin typeface="Cambria Math" panose="02040503050406030204" pitchFamily="18" charset="0"/>
+                            </a:rPr>
+                          </m:ctrlPr>
+                        </m:sSubSupPr>
+                        <m:e>
+                          <m:r>
+                            <a:rPr lang="en-US" i="1">
+                              <a:latin typeface="Cambria Math" panose="02040503050406030204" pitchFamily="18" charset="0"/>
+                              <a:ea typeface="Calibri" panose="020F0502020204030204" pitchFamily="34" charset="0"/>
+                              <a:cs typeface="Times New Roman" panose="02020603050405020304" pitchFamily="18" charset="0"/>
+                            </a:rPr>
+                            <m:t> </m:t>
+                          </m:r>
+                          <m:bar>
+                            <m:barPr>
+                              <m:ctrlPr>
+                                <a:rPr lang="en-US" i="1">
+                                  <a:latin typeface="Cambria Math" panose="02040503050406030204" pitchFamily="18" charset="0"/>
+                                </a:rPr>
+                              </m:ctrlPr>
+                            </m:barPr>
+                            <m:e>
+                              <m:r>
+                                <a:rPr lang="en-US" i="1">
+                                  <a:latin typeface="Cambria Math" panose="02040503050406030204" pitchFamily="18" charset="0"/>
+                                  <a:ea typeface="Calibri" panose="020F0502020204030204" pitchFamily="34" charset="0"/>
+                                  <a:cs typeface="Times New Roman" panose="02020603050405020304" pitchFamily="18" charset="0"/>
+                                </a:rPr>
+                                <m:t>𝜓</m:t>
+                              </m:r>
+                            </m:e>
+                          </m:bar>
+                        </m:e>
+                        <m:sub>
+                          <m:r>
+                            <a:rPr lang="cs-CZ" i="1">
+                              <a:latin typeface="Cambria Math" panose="02040503050406030204" pitchFamily="18" charset="0"/>
+                              <a:ea typeface="Calibri" panose="020F0502020204030204" pitchFamily="34" charset="0"/>
+                              <a:cs typeface="Times New Roman" panose="02020603050405020304" pitchFamily="18" charset="0"/>
+                            </a:rPr>
+                            <m:t>1</m:t>
+                          </m:r>
+                        </m:sub>
+                        <m:sup>
+                          <m:r>
+                            <a:rPr lang="cs-CZ" i="1" smtClean="0">
+                              <a:latin typeface="Cambria Math" panose="02040503050406030204" pitchFamily="18" charset="0"/>
+                              <a:ea typeface="Calibri" panose="020F0502020204030204" pitchFamily="34" charset="0"/>
+                              <a:cs typeface="Times New Roman" panose="02020603050405020304" pitchFamily="18" charset="0"/>
+                            </a:rPr>
+                            <m:t>𝛼𝛽</m:t>
+                          </m:r>
+                        </m:sup>
+                      </m:sSubSup>
+                      <m:r>
+                        <a:rPr lang="cs-CZ" i="1">
+                          <a:latin typeface="Cambria Math" panose="02040503050406030204" pitchFamily="18" charset="0"/>
+                        </a:rPr>
+                        <m:t>=</m:t>
+                      </m:r>
+                      <m:nary>
+                        <m:naryPr>
+                          <m:ctrlPr>
+                            <a:rPr lang="cs-CZ" i="1">
+                              <a:latin typeface="Cambria Math" panose="02040503050406030204" pitchFamily="18" charset="0"/>
+                            </a:rPr>
+                          </m:ctrlPr>
+                        </m:naryPr>
+                        <m:sub>
+                          <m:r>
+                            <m:rPr>
+                              <m:brk m:alnAt="23"/>
+                            </m:rPr>
+                            <a:rPr lang="cs-CZ" i="1">
+                              <a:latin typeface="Cambria Math" panose="02040503050406030204" pitchFamily="18" charset="0"/>
+                            </a:rPr>
+                            <m:t>0</m:t>
+                          </m:r>
+                        </m:sub>
+                        <m:sup>
+                          <m:r>
+                            <a:rPr lang="cs-CZ" i="1">
+                              <a:latin typeface="Cambria Math" panose="02040503050406030204" pitchFamily="18" charset="0"/>
+                            </a:rPr>
+                            <m:t>𝑡</m:t>
+                          </m:r>
+                        </m:sup>
+                        <m:e>
+                          <m:d>
+                            <m:dPr>
+                              <m:ctrlPr>
+                                <a:rPr lang="cs-CZ" i="1">
+                                  <a:latin typeface="Cambria Math" panose="02040503050406030204" pitchFamily="18" charset="0"/>
+                                </a:rPr>
+                              </m:ctrlPr>
+                            </m:dPr>
+                            <m:e>
+                              <m:sSubSup>
+                                <m:sSubSupPr>
+                                  <m:ctrlPr>
+                                    <a:rPr lang="cs-CZ" i="1">
+                                      <a:latin typeface="Cambria Math" panose="02040503050406030204" pitchFamily="18" charset="0"/>
+                                    </a:rPr>
+                                  </m:ctrlPr>
+                                </m:sSubSupPr>
+                                <m:e>
+                                  <m:bar>
+                                    <m:barPr>
+                                      <m:ctrlPr>
+                                        <a:rPr lang="en-US" i="1">
+                                          <a:latin typeface="Cambria Math" panose="02040503050406030204" pitchFamily="18" charset="0"/>
+                                        </a:rPr>
+                                      </m:ctrlPr>
+                                    </m:barPr>
+                                    <m:e>
+                                      <m:r>
+                                        <a:rPr lang="cs-CZ" i="1">
+                                          <a:latin typeface="Cambria Math" panose="02040503050406030204" pitchFamily="18" charset="0"/>
+                                        </a:rPr>
+                                        <m:t>𝑢</m:t>
+                                      </m:r>
+                                    </m:e>
+                                  </m:bar>
+                                </m:e>
+                                <m:sub>
+                                  <m:r>
+                                    <a:rPr lang="cs-CZ" i="1">
+                                      <a:latin typeface="Cambria Math" panose="02040503050406030204" pitchFamily="18" charset="0"/>
+                                    </a:rPr>
+                                    <m:t>1</m:t>
+                                  </m:r>
+                                </m:sub>
+                                <m:sup>
+                                  <m:r>
+                                    <a:rPr lang="cs-CZ" i="1">
+                                      <a:latin typeface="Cambria Math" panose="02040503050406030204" pitchFamily="18" charset="0"/>
+                                      <a:ea typeface="Calibri" panose="020F0502020204030204" pitchFamily="34" charset="0"/>
+                                      <a:cs typeface="Times New Roman" panose="02020603050405020304" pitchFamily="18" charset="0"/>
+                                    </a:rPr>
+                                    <m:t>𝛼𝛽</m:t>
+                                  </m:r>
+                                </m:sup>
+                              </m:sSubSup>
+                              <m:r>
+                                <a:rPr lang="cs-CZ" i="1">
+                                  <a:latin typeface="Cambria Math" panose="02040503050406030204" pitchFamily="18" charset="0"/>
+                                </a:rPr>
+                                <m:t>−</m:t>
+                              </m:r>
+                              <m:sSub>
+                                <m:sSubPr>
+                                  <m:ctrlPr>
+                                    <a:rPr lang="cs-CZ" i="1">
+                                      <a:latin typeface="Cambria Math" panose="02040503050406030204" pitchFamily="18" charset="0"/>
+                                    </a:rPr>
+                                  </m:ctrlPr>
+                                </m:sSubPr>
+                                <m:e>
+                                  <m:r>
+                                    <a:rPr lang="cs-CZ" i="1">
+                                      <a:latin typeface="Cambria Math" panose="02040503050406030204" pitchFamily="18" charset="0"/>
+                                    </a:rPr>
+                                    <m:t>𝑅</m:t>
+                                  </m:r>
+                                </m:e>
+                                <m:sub>
+                                  <m:r>
+                                    <a:rPr lang="cs-CZ" i="1">
+                                      <a:latin typeface="Cambria Math" panose="02040503050406030204" pitchFamily="18" charset="0"/>
+                                    </a:rPr>
+                                    <m:t>1</m:t>
+                                  </m:r>
+                                </m:sub>
+                              </m:sSub>
+                              <m:sSubSup>
+                                <m:sSubSupPr>
+                                  <m:ctrlPr>
+                                    <a:rPr lang="cs-CZ" i="1">
+                                      <a:latin typeface="Cambria Math" panose="02040503050406030204" pitchFamily="18" charset="0"/>
+                                    </a:rPr>
+                                  </m:ctrlPr>
+                                </m:sSubSupPr>
+                                <m:e>
+                                  <m:bar>
+                                    <m:barPr>
+                                      <m:ctrlPr>
+                                        <a:rPr lang="en-US" i="1">
+                                          <a:latin typeface="Cambria Math" panose="02040503050406030204" pitchFamily="18" charset="0"/>
+                                        </a:rPr>
+                                      </m:ctrlPr>
+                                    </m:barPr>
+                                    <m:e>
+                                      <m:r>
+                                        <a:rPr lang="cs-CZ" i="1">
+                                          <a:latin typeface="Cambria Math" panose="02040503050406030204" pitchFamily="18" charset="0"/>
+                                        </a:rPr>
+                                        <m:t>𝑖</m:t>
+                                      </m:r>
+                                    </m:e>
+                                  </m:bar>
+                                </m:e>
+                                <m:sub>
+                                  <m:r>
+                                    <a:rPr lang="cs-CZ" i="1">
+                                      <a:latin typeface="Cambria Math" panose="02040503050406030204" pitchFamily="18" charset="0"/>
+                                    </a:rPr>
+                                    <m:t>1</m:t>
+                                  </m:r>
+                                </m:sub>
+                                <m:sup>
+                                  <m:r>
+                                    <a:rPr lang="cs-CZ" i="1">
+                                      <a:latin typeface="Cambria Math" panose="02040503050406030204" pitchFamily="18" charset="0"/>
+                                      <a:ea typeface="Calibri" panose="020F0502020204030204" pitchFamily="34" charset="0"/>
+                                      <a:cs typeface="Times New Roman" panose="02020603050405020304" pitchFamily="18" charset="0"/>
+                                    </a:rPr>
+                                    <m:t>𝛼𝛽</m:t>
+                                  </m:r>
+                                </m:sup>
+                              </m:sSubSup>
+                            </m:e>
+                          </m:d>
+                        </m:e>
+                      </m:nary>
+                      <m:r>
+                        <m:rPr>
+                          <m:sty m:val="p"/>
+                        </m:rPr>
+                        <a:rPr lang="cs-CZ">
+                          <a:latin typeface="Cambria Math" panose="02040503050406030204" pitchFamily="18" charset="0"/>
+                        </a:rPr>
+                        <m:t>d</m:t>
+                      </m:r>
+                      <m:r>
+                        <a:rPr lang="cs-CZ" i="1">
+                          <a:latin typeface="Cambria Math" panose="02040503050406030204" pitchFamily="18" charset="0"/>
+                        </a:rPr>
+                        <m:t>𝜏</m:t>
+                      </m:r>
+                      <m:r>
+                        <a:rPr lang="cs-CZ" b="0" i="1" smtClean="0">
+                          <a:latin typeface="Cambria Math" panose="02040503050406030204" pitchFamily="18" charset="0"/>
+                        </a:rPr>
+                        <m:t>.</m:t>
+                      </m:r>
+                    </m:oMath>
+                  </m:oMathPara>
+                </a14:m>
+                <a:endParaRPr lang="cs-CZ" dirty="0"/>
+              </a:p>
+              <a:p>
+                <a:pPr marL="0" indent="0">
+                  <a:buNone/>
+                </a:pPr>
+                <a:endParaRPr lang="en-US" dirty="0"/>
+              </a:p>
+            </p:txBody>
+          </p:sp>
+        </mc:Choice>
+        <mc:Fallback xmlns="">
+          <p:sp>
+            <p:nvSpPr>
+              <p:cNvPr id="3" name="Zástupný obsah 2">
+                <a:extLst>
+                  <a:ext uri="{FF2B5EF4-FFF2-40B4-BE49-F238E27FC236}">
+                    <a16:creationId xmlns:a16="http://schemas.microsoft.com/office/drawing/2014/main" id="{E7D969BC-ADF2-0ADD-9B62-A691718A88B3}"/>
+                  </a:ext>
+                </a:extLst>
+              </p:cNvPr>
+              <p:cNvSpPr>
+                <a:spLocks noGrp="1" noRot="1" noChangeAspect="1" noMove="1" noResize="1" noEditPoints="1" noAdjustHandles="1" noChangeArrowheads="1" noChangeShapeType="1" noTextEdit="1"/>
+              </p:cNvSpPr>
+              <p:nvPr>
+                <p:ph idx="1"/>
+              </p:nvPr>
+            </p:nvSpPr>
+            <p:spPr>
+              <a:blipFill>
+                <a:blip r:embed="rId2"/>
+                <a:stretch>
+                  <a:fillRect l="-1865" t="-1982" r="-1588"/>
+                </a:stretch>
+              </a:blipFill>
+            </p:spPr>
+            <p:txBody>
+              <a:bodyPr/>
+              <a:lstStyle/>
+              <a:p>
+                <a:r>
+                  <a:rPr lang="en-US">
+                    <a:noFill/>
+                  </a:rPr>
+                  <a:t> </a:t>
+                </a:r>
+              </a:p>
+            </p:txBody>
+          </p:sp>
+        </mc:Fallback>
+      </mc:AlternateContent>
     </p:spTree>
     <p:extLst>
       <p:ext uri="{BB962C8B-B14F-4D97-AF65-F5344CB8AC3E}">
-        <p14:creationId xmlns:p14="http://schemas.microsoft.com/office/powerpoint/2010/main" val="3895337258"/>
+        <p14:creationId xmlns:p14="http://schemas.microsoft.com/office/powerpoint/2010/main" val="1952982223"/>
       </p:ext>
     </p:extLst>
   </p:cSld>
@@ -17958,77 +18159,84 @@
       </p:grpSpPr>
       <p:sp>
         <p:nvSpPr>
-          <p:cNvPr id="2" name="Title 1">
+          <p:cNvPr id="4" name="Rectangle 3">
             <a:extLst>
               <a:ext uri="{FF2B5EF4-FFF2-40B4-BE49-F238E27FC236}">
-                <a16:creationId xmlns:a16="http://schemas.microsoft.com/office/drawing/2014/main" id="{A45BF3FC-B5FE-3BED-EB28-4FC2D7EDCAA2}"/>
+                <a16:creationId xmlns:a16="http://schemas.microsoft.com/office/drawing/2014/main" id="{CBC4BD6D-D679-68FE-29B9-86A257FF02AF}"/>
               </a:ext>
             </a:extLst>
           </p:cNvPr>
-          <p:cNvSpPr>
-            <a:spLocks noGrp="1"/>
-          </p:cNvSpPr>
-          <p:nvPr>
-            <p:ph type="title"/>
-          </p:nvPr>
+          <p:cNvSpPr/>
+          <p:nvPr/>
         </p:nvSpPr>
-        <p:spPr>
+        <p:spPr bwMode="auto">
           <a:xfrm>
-            <a:off x="1" y="307777"/>
-            <a:ext cx="10080624" cy="1095796"/>
-          </a:xfrm>
-        </p:spPr>
-        <p:txBody>
-          <a:bodyPr/>
-          <a:lstStyle/>
-          <a:p>
-            <a:r>
-              <a:rPr lang="en-CZ" dirty="0"/>
-              <a:t>Uspořádání pracoviště</a:t>
-            </a:r>
-          </a:p>
-        </p:txBody>
-      </p:sp>
-      <p:pic>
-        <p:nvPicPr>
-          <p:cNvPr id="4" name="Picture 3">
-            <a:extLst>
-              <a:ext uri="{FF2B5EF4-FFF2-40B4-BE49-F238E27FC236}">
-                <a16:creationId xmlns:a16="http://schemas.microsoft.com/office/drawing/2014/main" id="{3847CDE0-46E1-AD26-385E-729E597ED249}"/>
-              </a:ext>
-            </a:extLst>
-          </p:cNvPr>
-          <p:cNvPicPr>
-            <a:picLocks noChangeAspect="1"/>
-          </p:cNvPicPr>
-          <p:nvPr/>
-        </p:nvPicPr>
-        <p:blipFill>
-          <a:blip r:embed="rId2">
-            <a:extLst>
-              <a:ext uri="{28A0092B-C50C-407E-A947-70E740481C1C}">
-                <a14:useLocalDpi xmlns:a14="http://schemas.microsoft.com/office/drawing/2010/main" val="0"/>
-              </a:ext>
-            </a:extLst>
-          </a:blip>
-          <a:stretch>
-            <a:fillRect/>
-          </a:stretch>
-        </p:blipFill>
-        <p:spPr>
-          <a:xfrm>
-            <a:off x="184677" y="1367930"/>
-            <a:ext cx="9711270" cy="4641011"/>
+            <a:off x="0" y="0"/>
+            <a:ext cx="10080625" cy="7559675"/>
           </a:xfrm>
           <a:prstGeom prst="rect">
             <a:avLst/>
           </a:prstGeom>
+          <a:solidFill>
+            <a:schemeClr val="tx1"/>
+          </a:solidFill>
+          <a:ln w="9525" cap="flat" cmpd="sng" algn="ctr">
+            <a:solidFill>
+              <a:schemeClr val="tx1"/>
+            </a:solidFill>
+            <a:prstDash val="solid"/>
+            <a:round/>
+            <a:headEnd type="none" w="med" len="med"/>
+            <a:tailEnd type="none" w="med" len="med"/>
+          </a:ln>
+          <a:effectLst/>
         </p:spPr>
-      </p:pic>
+        <p:txBody>
+          <a:bodyPr vert="horz" wrap="square" lIns="91440" tIns="45720" rIns="91440" bIns="45720" numCol="1" rtlCol="0" anchor="t" anchorCtr="0" compatLnSpc="1">
+            <a:prstTxWarp prst="textNoShape">
+              <a:avLst/>
+            </a:prstTxWarp>
+          </a:bodyPr>
+          <a:lstStyle/>
+          <a:p>
+            <a:pPr marL="0" marR="0" indent="0" algn="l" defTabSz="449263" rtl="0" eaLnBrk="1" fontAlgn="base" latinLnBrk="0" hangingPunct="0">
+              <a:lnSpc>
+                <a:spcPct val="93000"/>
+              </a:lnSpc>
+              <a:spcBef>
+                <a:spcPct val="0"/>
+              </a:spcBef>
+              <a:spcAft>
+                <a:spcPct val="0"/>
+              </a:spcAft>
+              <a:buClr>
+                <a:srgbClr val="000000"/>
+              </a:buClr>
+              <a:buSzPct val="100000"/>
+              <a:buFont typeface="Times New Roman" panose="02020603050405020304" pitchFamily="18" charset="0"/>
+              <a:buNone/>
+              <a:tabLst/>
+            </a:pPr>
+            <a:endParaRPr kumimoji="0" lang="en-CZ" sz="1800" b="0" i="0" u="none" strike="noStrike" cap="none" normalizeH="0" baseline="0" dirty="0">
+              <a:ln>
+                <a:solidFill>
+                  <a:sysClr val="windowText" lastClr="000000"/>
+                </a:solidFill>
+              </a:ln>
+              <a:solidFill>
+                <a:srgbClr val="E05206"/>
+              </a:solidFill>
+              <a:effectLst/>
+              <a:latin typeface="Arial" panose="020B0604020202020204" pitchFamily="34" charset="0"/>
+              <a:cs typeface="WenQuanYi Zen Hei" charset="0"/>
+            </a:endParaRPr>
+          </a:p>
+        </p:txBody>
+      </p:sp>
     </p:spTree>
     <p:extLst>
       <p:ext uri="{BB962C8B-B14F-4D97-AF65-F5344CB8AC3E}">
-        <p14:creationId xmlns:p14="http://schemas.microsoft.com/office/powerpoint/2010/main" val="2508119481"/>
+        <p14:creationId xmlns:p14="http://schemas.microsoft.com/office/powerpoint/2010/main" val="2061360001"/>
       </p:ext>
     </p:extLst>
   </p:cSld>

</xml_diff>